<commit_message>
Add license file, delete placeholder boxes in slides
</commit_message>
<xml_diff>
--- a/units/3/lessons/8/resources/petascale-lesson-3.8-slides.pptx
+++ b/units/3/lessons/8/resources/petascale-lesson-3.8-slides.pptx
@@ -127,7 +127,7 @@
       <p15:sldGuideLst xmlns:p15="http://schemas.microsoft.com/office/powerpoint/2012/main"/>
     </p:ext>
     <p:ext uri="http://customooxmlschemas.google.com/">
-      <go:slidesCustomData xmlns:go="http://customooxmlschemas.google.com/" xmlns:p15="http://schemas.microsoft.com/office/powerpoint/2012/main" xmlns="" roundtripDataSignature="AMtx7mhOhAlEUOi/OG3o+t3evIJyqvyxnQ==" r:id="rId23"/>
+      <go:slidesCustomData xmlns="" xmlns:p15="http://schemas.microsoft.com/office/powerpoint/2012/main" xmlns:go="http://customooxmlschemas.google.com/" roundtripDataSignature="AMtx7mhOhAlEUOi/OG3o+t3evIJyqvyxnQ==" r:id="rId23"/>
     </p:ext>
   </p:extLst>
 </p:presentation>
@@ -221,7 +221,7 @@
           <a:p>
             <a:fld id="{84E1016C-1A58-4CA4-A72C-FFAAF17E373D}" type="datetimeFigureOut">
               <a:rPr lang="en-US" smtClean="0"/>
-              <a:t>10/11/20</a:t>
+              <a:t>11/20/20</a:t>
             </a:fld>
             <a:endParaRPr lang="en-US"/>
           </a:p>
@@ -681,7 +681,7 @@
           <p:cNvPr id="2" name="Title 1">
             <a:extLst>
               <a:ext uri="{FF2B5EF4-FFF2-40B4-BE49-F238E27FC236}">
-                <a16:creationId xmlns:a16="http://schemas.microsoft.com/office/drawing/2014/main" xmlns="" id="{4BF1548A-031C-4017-A469-1F6F57DFA337}"/>
+                <a16:creationId xmlns="" xmlns:a16="http://schemas.microsoft.com/office/drawing/2014/main" id="{4BF1548A-031C-4017-A469-1F6F57DFA337}"/>
               </a:ext>
             </a:extLst>
           </p:cNvPr>
@@ -718,7 +718,7 @@
           <p:cNvPr id="3" name="Subtitle 2">
             <a:extLst>
               <a:ext uri="{FF2B5EF4-FFF2-40B4-BE49-F238E27FC236}">
-                <a16:creationId xmlns:a16="http://schemas.microsoft.com/office/drawing/2014/main" xmlns="" id="{74304642-FB16-43CB-BDB2-BE565D19B085}"/>
+                <a16:creationId xmlns="" xmlns:a16="http://schemas.microsoft.com/office/drawing/2014/main" id="{74304642-FB16-43CB-BDB2-BE565D19B085}"/>
               </a:ext>
             </a:extLst>
           </p:cNvPr>
@@ -788,7 +788,7 @@
           <p:cNvPr id="4" name="Date Placeholder 3">
             <a:extLst>
               <a:ext uri="{FF2B5EF4-FFF2-40B4-BE49-F238E27FC236}">
-                <a16:creationId xmlns:a16="http://schemas.microsoft.com/office/drawing/2014/main" xmlns="" id="{9E17A357-5A12-4FB6-831E-263725DE7068}"/>
+                <a16:creationId xmlns="" xmlns:a16="http://schemas.microsoft.com/office/drawing/2014/main" id="{9E17A357-5A12-4FB6-831E-263725DE7068}"/>
               </a:ext>
             </a:extLst>
           </p:cNvPr>
@@ -806,7 +806,7 @@
           <a:p>
             <a:fld id="{3C4DF5B9-6226-4C75-9420-E8D17C4C152E}" type="datetimeFigureOut">
               <a:rPr lang="en-US" smtClean="0"/>
-              <a:t>10/11/20</a:t>
+              <a:t>11/20/20</a:t>
             </a:fld>
             <a:endParaRPr lang="en-US"/>
           </a:p>
@@ -817,7 +817,7 @@
           <p:cNvPr id="5" name="Footer Placeholder 4">
             <a:extLst>
               <a:ext uri="{FF2B5EF4-FFF2-40B4-BE49-F238E27FC236}">
-                <a16:creationId xmlns:a16="http://schemas.microsoft.com/office/drawing/2014/main" xmlns="" id="{3B560D76-737D-4F45-B02B-C64E83044C23}"/>
+                <a16:creationId xmlns="" xmlns:a16="http://schemas.microsoft.com/office/drawing/2014/main" id="{3B560D76-737D-4F45-B02B-C64E83044C23}"/>
               </a:ext>
             </a:extLst>
           </p:cNvPr>
@@ -842,7 +842,7 @@
           <p:cNvPr id="6" name="Slide Number Placeholder 5">
             <a:extLst>
               <a:ext uri="{FF2B5EF4-FFF2-40B4-BE49-F238E27FC236}">
-                <a16:creationId xmlns:a16="http://schemas.microsoft.com/office/drawing/2014/main" xmlns="" id="{711C5EBC-DAA7-44A9-87F6-D6E5BF882F57}"/>
+                <a16:creationId xmlns="" xmlns:a16="http://schemas.microsoft.com/office/drawing/2014/main" id="{711C5EBC-DAA7-44A9-87F6-D6E5BF882F57}"/>
               </a:ext>
             </a:extLst>
           </p:cNvPr>
@@ -901,7 +901,7 @@
           <p:cNvPr id="2" name="Title 1">
             <a:extLst>
               <a:ext uri="{FF2B5EF4-FFF2-40B4-BE49-F238E27FC236}">
-                <a16:creationId xmlns:a16="http://schemas.microsoft.com/office/drawing/2014/main" xmlns="" id="{92017ED8-32D3-48A9-865B-D1F7D0D54091}"/>
+                <a16:creationId xmlns="" xmlns:a16="http://schemas.microsoft.com/office/drawing/2014/main" id="{92017ED8-32D3-48A9-865B-D1F7D0D54091}"/>
               </a:ext>
             </a:extLst>
           </p:cNvPr>
@@ -929,7 +929,7 @@
           <p:cNvPr id="3" name="Vertical Text Placeholder 2">
             <a:extLst>
               <a:ext uri="{FF2B5EF4-FFF2-40B4-BE49-F238E27FC236}">
-                <a16:creationId xmlns:a16="http://schemas.microsoft.com/office/drawing/2014/main" xmlns="" id="{42CC3ACB-AF72-4D39-8202-0ABA6ADAAFFC}"/>
+                <a16:creationId xmlns="" xmlns:a16="http://schemas.microsoft.com/office/drawing/2014/main" id="{42CC3ACB-AF72-4D39-8202-0ABA6ADAAFFC}"/>
               </a:ext>
             </a:extLst>
           </p:cNvPr>
@@ -986,7 +986,7 @@
           <p:cNvPr id="4" name="Date Placeholder 3">
             <a:extLst>
               <a:ext uri="{FF2B5EF4-FFF2-40B4-BE49-F238E27FC236}">
-                <a16:creationId xmlns:a16="http://schemas.microsoft.com/office/drawing/2014/main" xmlns="" id="{CBAE86A8-0336-475E-8C53-378986A0913F}"/>
+                <a16:creationId xmlns="" xmlns:a16="http://schemas.microsoft.com/office/drawing/2014/main" id="{CBAE86A8-0336-475E-8C53-378986A0913F}"/>
               </a:ext>
             </a:extLst>
           </p:cNvPr>
@@ -1004,7 +1004,7 @@
           <a:p>
             <a:fld id="{3C4DF5B9-6226-4C75-9420-E8D17C4C152E}" type="datetimeFigureOut">
               <a:rPr lang="en-US" smtClean="0"/>
-              <a:t>10/11/20</a:t>
+              <a:t>11/20/20</a:t>
             </a:fld>
             <a:endParaRPr lang="en-US"/>
           </a:p>
@@ -1015,7 +1015,7 @@
           <p:cNvPr id="5" name="Footer Placeholder 4">
             <a:extLst>
               <a:ext uri="{FF2B5EF4-FFF2-40B4-BE49-F238E27FC236}">
-                <a16:creationId xmlns:a16="http://schemas.microsoft.com/office/drawing/2014/main" xmlns="" id="{7DAF4AD7-F88E-4B18-978A-9BD28F63CC1A}"/>
+                <a16:creationId xmlns="" xmlns:a16="http://schemas.microsoft.com/office/drawing/2014/main" id="{7DAF4AD7-F88E-4B18-978A-9BD28F63CC1A}"/>
               </a:ext>
             </a:extLst>
           </p:cNvPr>
@@ -1040,7 +1040,7 @@
           <p:cNvPr id="6" name="Slide Number Placeholder 5">
             <a:extLst>
               <a:ext uri="{FF2B5EF4-FFF2-40B4-BE49-F238E27FC236}">
-                <a16:creationId xmlns:a16="http://schemas.microsoft.com/office/drawing/2014/main" xmlns="" id="{0ACE9313-B78B-4B28-9BBD-0BA91A2593EA}"/>
+                <a16:creationId xmlns="" xmlns:a16="http://schemas.microsoft.com/office/drawing/2014/main" id="{0ACE9313-B78B-4B28-9BBD-0BA91A2593EA}"/>
               </a:ext>
             </a:extLst>
           </p:cNvPr>
@@ -1099,7 +1099,7 @@
           <p:cNvPr id="2" name="Vertical Title 1">
             <a:extLst>
               <a:ext uri="{FF2B5EF4-FFF2-40B4-BE49-F238E27FC236}">
-                <a16:creationId xmlns:a16="http://schemas.microsoft.com/office/drawing/2014/main" xmlns="" id="{ACDED3BC-5406-4FD7-8220-DA00CDF3FFE2}"/>
+                <a16:creationId xmlns="" xmlns:a16="http://schemas.microsoft.com/office/drawing/2014/main" id="{ACDED3BC-5406-4FD7-8220-DA00CDF3FFE2}"/>
               </a:ext>
             </a:extLst>
           </p:cNvPr>
@@ -1132,7 +1132,7 @@
           <p:cNvPr id="3" name="Vertical Text Placeholder 2">
             <a:extLst>
               <a:ext uri="{FF2B5EF4-FFF2-40B4-BE49-F238E27FC236}">
-                <a16:creationId xmlns:a16="http://schemas.microsoft.com/office/drawing/2014/main" xmlns="" id="{DC33A346-AFBF-4885-ABCB-E5FE8DA8A816}"/>
+                <a16:creationId xmlns="" xmlns:a16="http://schemas.microsoft.com/office/drawing/2014/main" id="{DC33A346-AFBF-4885-ABCB-E5FE8DA8A816}"/>
               </a:ext>
             </a:extLst>
           </p:cNvPr>
@@ -1194,7 +1194,7 @@
           <p:cNvPr id="4" name="Date Placeholder 3">
             <a:extLst>
               <a:ext uri="{FF2B5EF4-FFF2-40B4-BE49-F238E27FC236}">
-                <a16:creationId xmlns:a16="http://schemas.microsoft.com/office/drawing/2014/main" xmlns="" id="{D1C59FBE-5C0E-46E3-8F73-D3B85FFB7049}"/>
+                <a16:creationId xmlns="" xmlns:a16="http://schemas.microsoft.com/office/drawing/2014/main" id="{D1C59FBE-5C0E-46E3-8F73-D3B85FFB7049}"/>
               </a:ext>
             </a:extLst>
           </p:cNvPr>
@@ -1212,7 +1212,7 @@
           <a:p>
             <a:fld id="{3C4DF5B9-6226-4C75-9420-E8D17C4C152E}" type="datetimeFigureOut">
               <a:rPr lang="en-US" smtClean="0"/>
-              <a:t>10/11/20</a:t>
+              <a:t>11/20/20</a:t>
             </a:fld>
             <a:endParaRPr lang="en-US"/>
           </a:p>
@@ -1223,7 +1223,7 @@
           <p:cNvPr id="5" name="Footer Placeholder 4">
             <a:extLst>
               <a:ext uri="{FF2B5EF4-FFF2-40B4-BE49-F238E27FC236}">
-                <a16:creationId xmlns:a16="http://schemas.microsoft.com/office/drawing/2014/main" xmlns="" id="{AD2B8963-6DEF-4C8E-9E8B-3657C93F1301}"/>
+                <a16:creationId xmlns="" xmlns:a16="http://schemas.microsoft.com/office/drawing/2014/main" id="{AD2B8963-6DEF-4C8E-9E8B-3657C93F1301}"/>
               </a:ext>
             </a:extLst>
           </p:cNvPr>
@@ -1248,7 +1248,7 @@
           <p:cNvPr id="6" name="Slide Number Placeholder 5">
             <a:extLst>
               <a:ext uri="{FF2B5EF4-FFF2-40B4-BE49-F238E27FC236}">
-                <a16:creationId xmlns:a16="http://schemas.microsoft.com/office/drawing/2014/main" xmlns="" id="{388038DF-83CC-45F7-90AD-68EA5D4E83A4}"/>
+                <a16:creationId xmlns="" xmlns:a16="http://schemas.microsoft.com/office/drawing/2014/main" id="{388038DF-83CC-45F7-90AD-68EA5D4E83A4}"/>
               </a:ext>
             </a:extLst>
           </p:cNvPr>
@@ -1307,7 +1307,7 @@
           <p:cNvPr id="2" name="Title 1">
             <a:extLst>
               <a:ext uri="{FF2B5EF4-FFF2-40B4-BE49-F238E27FC236}">
-                <a16:creationId xmlns:a16="http://schemas.microsoft.com/office/drawing/2014/main" xmlns="" id="{77C8F21E-0BA7-4D7B-8E95-5004BB0FB263}"/>
+                <a16:creationId xmlns="" xmlns:a16="http://schemas.microsoft.com/office/drawing/2014/main" id="{77C8F21E-0BA7-4D7B-8E95-5004BB0FB263}"/>
               </a:ext>
             </a:extLst>
           </p:cNvPr>
@@ -1335,7 +1335,7 @@
           <p:cNvPr id="3" name="Content Placeholder 2">
             <a:extLst>
               <a:ext uri="{FF2B5EF4-FFF2-40B4-BE49-F238E27FC236}">
-                <a16:creationId xmlns:a16="http://schemas.microsoft.com/office/drawing/2014/main" xmlns="" id="{A2579068-4E3F-47D8-9543-2CE3A5353012}"/>
+                <a16:creationId xmlns="" xmlns:a16="http://schemas.microsoft.com/office/drawing/2014/main" id="{A2579068-4E3F-47D8-9543-2CE3A5353012}"/>
               </a:ext>
             </a:extLst>
           </p:cNvPr>
@@ -1392,7 +1392,7 @@
           <p:cNvPr id="4" name="Date Placeholder 3">
             <a:extLst>
               <a:ext uri="{FF2B5EF4-FFF2-40B4-BE49-F238E27FC236}">
-                <a16:creationId xmlns:a16="http://schemas.microsoft.com/office/drawing/2014/main" xmlns="" id="{E2D1C011-12E6-44E4-A195-99E6DE27D293}"/>
+                <a16:creationId xmlns="" xmlns:a16="http://schemas.microsoft.com/office/drawing/2014/main" id="{E2D1C011-12E6-44E4-A195-99E6DE27D293}"/>
               </a:ext>
             </a:extLst>
           </p:cNvPr>
@@ -1410,7 +1410,7 @@
           <a:p>
             <a:fld id="{3C4DF5B9-6226-4C75-9420-E8D17C4C152E}" type="datetimeFigureOut">
               <a:rPr lang="en-US" smtClean="0"/>
-              <a:t>10/11/20</a:t>
+              <a:t>11/20/20</a:t>
             </a:fld>
             <a:endParaRPr lang="en-US"/>
           </a:p>
@@ -1421,7 +1421,7 @@
           <p:cNvPr id="5" name="Footer Placeholder 4">
             <a:extLst>
               <a:ext uri="{FF2B5EF4-FFF2-40B4-BE49-F238E27FC236}">
-                <a16:creationId xmlns:a16="http://schemas.microsoft.com/office/drawing/2014/main" xmlns="" id="{89FA2B6E-3830-4EA4-928D-4D5F317D0F8B}"/>
+                <a16:creationId xmlns="" xmlns:a16="http://schemas.microsoft.com/office/drawing/2014/main" id="{89FA2B6E-3830-4EA4-928D-4D5F317D0F8B}"/>
               </a:ext>
             </a:extLst>
           </p:cNvPr>
@@ -1446,7 +1446,7 @@
           <p:cNvPr id="6" name="Slide Number Placeholder 5">
             <a:extLst>
               <a:ext uri="{FF2B5EF4-FFF2-40B4-BE49-F238E27FC236}">
-                <a16:creationId xmlns:a16="http://schemas.microsoft.com/office/drawing/2014/main" xmlns="" id="{68C8C216-3724-451A-BE89-E30F691F09CB}"/>
+                <a16:creationId xmlns="" xmlns:a16="http://schemas.microsoft.com/office/drawing/2014/main" id="{68C8C216-3724-451A-BE89-E30F691F09CB}"/>
               </a:ext>
             </a:extLst>
           </p:cNvPr>
@@ -1505,7 +1505,7 @@
           <p:cNvPr id="2" name="Title 1">
             <a:extLst>
               <a:ext uri="{FF2B5EF4-FFF2-40B4-BE49-F238E27FC236}">
-                <a16:creationId xmlns:a16="http://schemas.microsoft.com/office/drawing/2014/main" xmlns="" id="{231B92F1-AE35-479A-A1DB-99B1583CDD81}"/>
+                <a16:creationId xmlns="" xmlns:a16="http://schemas.microsoft.com/office/drawing/2014/main" id="{231B92F1-AE35-479A-A1DB-99B1583CDD81}"/>
               </a:ext>
             </a:extLst>
           </p:cNvPr>
@@ -1542,7 +1542,7 @@
           <p:cNvPr id="3" name="Text Placeholder 2">
             <a:extLst>
               <a:ext uri="{FF2B5EF4-FFF2-40B4-BE49-F238E27FC236}">
-                <a16:creationId xmlns:a16="http://schemas.microsoft.com/office/drawing/2014/main" xmlns="" id="{510A97F5-CF09-4A2D-BF21-2B70E8AD551C}"/>
+                <a16:creationId xmlns="" xmlns:a16="http://schemas.microsoft.com/office/drawing/2014/main" id="{510A97F5-CF09-4A2D-BF21-2B70E8AD551C}"/>
               </a:ext>
             </a:extLst>
           </p:cNvPr>
@@ -1667,7 +1667,7 @@
           <p:cNvPr id="4" name="Date Placeholder 3">
             <a:extLst>
               <a:ext uri="{FF2B5EF4-FFF2-40B4-BE49-F238E27FC236}">
-                <a16:creationId xmlns:a16="http://schemas.microsoft.com/office/drawing/2014/main" xmlns="" id="{0301327A-1010-450D-8DDD-14CC7ECF3AAB}"/>
+                <a16:creationId xmlns="" xmlns:a16="http://schemas.microsoft.com/office/drawing/2014/main" id="{0301327A-1010-450D-8DDD-14CC7ECF3AAB}"/>
               </a:ext>
             </a:extLst>
           </p:cNvPr>
@@ -1685,7 +1685,7 @@
           <a:p>
             <a:fld id="{3C4DF5B9-6226-4C75-9420-E8D17C4C152E}" type="datetimeFigureOut">
               <a:rPr lang="en-US" smtClean="0"/>
-              <a:t>10/11/20</a:t>
+              <a:t>11/20/20</a:t>
             </a:fld>
             <a:endParaRPr lang="en-US"/>
           </a:p>
@@ -1696,7 +1696,7 @@
           <p:cNvPr id="5" name="Footer Placeholder 4">
             <a:extLst>
               <a:ext uri="{FF2B5EF4-FFF2-40B4-BE49-F238E27FC236}">
-                <a16:creationId xmlns:a16="http://schemas.microsoft.com/office/drawing/2014/main" xmlns="" id="{9A389986-F889-43BB-BCFC-AF6054064011}"/>
+                <a16:creationId xmlns="" xmlns:a16="http://schemas.microsoft.com/office/drawing/2014/main" id="{9A389986-F889-43BB-BCFC-AF6054064011}"/>
               </a:ext>
             </a:extLst>
           </p:cNvPr>
@@ -1721,7 +1721,7 @@
           <p:cNvPr id="6" name="Slide Number Placeholder 5">
             <a:extLst>
               <a:ext uri="{FF2B5EF4-FFF2-40B4-BE49-F238E27FC236}">
-                <a16:creationId xmlns:a16="http://schemas.microsoft.com/office/drawing/2014/main" xmlns="" id="{2646CBB6-A5A9-4B55-85FE-AC05DF608DE8}"/>
+                <a16:creationId xmlns="" xmlns:a16="http://schemas.microsoft.com/office/drawing/2014/main" id="{2646CBB6-A5A9-4B55-85FE-AC05DF608DE8}"/>
               </a:ext>
             </a:extLst>
           </p:cNvPr>
@@ -1780,7 +1780,7 @@
           <p:cNvPr id="2" name="Title 1">
             <a:extLst>
               <a:ext uri="{FF2B5EF4-FFF2-40B4-BE49-F238E27FC236}">
-                <a16:creationId xmlns:a16="http://schemas.microsoft.com/office/drawing/2014/main" xmlns="" id="{D2B07227-E424-4031-BBB3-2AD61C3D0DE3}"/>
+                <a16:creationId xmlns="" xmlns:a16="http://schemas.microsoft.com/office/drawing/2014/main" id="{D2B07227-E424-4031-BBB3-2AD61C3D0DE3}"/>
               </a:ext>
             </a:extLst>
           </p:cNvPr>
@@ -1808,7 +1808,7 @@
           <p:cNvPr id="3" name="Content Placeholder 2">
             <a:extLst>
               <a:ext uri="{FF2B5EF4-FFF2-40B4-BE49-F238E27FC236}">
-                <a16:creationId xmlns:a16="http://schemas.microsoft.com/office/drawing/2014/main" xmlns="" id="{4BBE14F5-39A7-48DA-9FA0-D66708895C74}"/>
+                <a16:creationId xmlns="" xmlns:a16="http://schemas.microsoft.com/office/drawing/2014/main" id="{4BBE14F5-39A7-48DA-9FA0-D66708895C74}"/>
               </a:ext>
             </a:extLst>
           </p:cNvPr>
@@ -1870,7 +1870,7 @@
           <p:cNvPr id="4" name="Content Placeholder 3">
             <a:extLst>
               <a:ext uri="{FF2B5EF4-FFF2-40B4-BE49-F238E27FC236}">
-                <a16:creationId xmlns:a16="http://schemas.microsoft.com/office/drawing/2014/main" xmlns="" id="{CAD71E3C-60A0-4402-8888-62897F4CE693}"/>
+                <a16:creationId xmlns="" xmlns:a16="http://schemas.microsoft.com/office/drawing/2014/main" id="{CAD71E3C-60A0-4402-8888-62897F4CE693}"/>
               </a:ext>
             </a:extLst>
           </p:cNvPr>
@@ -1932,7 +1932,7 @@
           <p:cNvPr id="5" name="Date Placeholder 4">
             <a:extLst>
               <a:ext uri="{FF2B5EF4-FFF2-40B4-BE49-F238E27FC236}">
-                <a16:creationId xmlns:a16="http://schemas.microsoft.com/office/drawing/2014/main" xmlns="" id="{219C5DB4-2DC8-4210-B2F1-9F366713038C}"/>
+                <a16:creationId xmlns="" xmlns:a16="http://schemas.microsoft.com/office/drawing/2014/main" id="{219C5DB4-2DC8-4210-B2F1-9F366713038C}"/>
               </a:ext>
             </a:extLst>
           </p:cNvPr>
@@ -1950,7 +1950,7 @@
           <a:p>
             <a:fld id="{3C4DF5B9-6226-4C75-9420-E8D17C4C152E}" type="datetimeFigureOut">
               <a:rPr lang="en-US" smtClean="0"/>
-              <a:t>10/11/20</a:t>
+              <a:t>11/20/20</a:t>
             </a:fld>
             <a:endParaRPr lang="en-US"/>
           </a:p>
@@ -1961,7 +1961,7 @@
           <p:cNvPr id="6" name="Footer Placeholder 5">
             <a:extLst>
               <a:ext uri="{FF2B5EF4-FFF2-40B4-BE49-F238E27FC236}">
-                <a16:creationId xmlns:a16="http://schemas.microsoft.com/office/drawing/2014/main" xmlns="" id="{D4F7ABFA-7B68-4E83-8E08-7F5B44E13869}"/>
+                <a16:creationId xmlns="" xmlns:a16="http://schemas.microsoft.com/office/drawing/2014/main" id="{D4F7ABFA-7B68-4E83-8E08-7F5B44E13869}"/>
               </a:ext>
             </a:extLst>
           </p:cNvPr>
@@ -1986,7 +1986,7 @@
           <p:cNvPr id="7" name="Slide Number Placeholder 6">
             <a:extLst>
               <a:ext uri="{FF2B5EF4-FFF2-40B4-BE49-F238E27FC236}">
-                <a16:creationId xmlns:a16="http://schemas.microsoft.com/office/drawing/2014/main" xmlns="" id="{FE71CF60-10D0-4244-A96C-6C488AF3915D}"/>
+                <a16:creationId xmlns="" xmlns:a16="http://schemas.microsoft.com/office/drawing/2014/main" id="{FE71CF60-10D0-4244-A96C-6C488AF3915D}"/>
               </a:ext>
             </a:extLst>
           </p:cNvPr>
@@ -2045,7 +2045,7 @@
           <p:cNvPr id="2" name="Title 1">
             <a:extLst>
               <a:ext uri="{FF2B5EF4-FFF2-40B4-BE49-F238E27FC236}">
-                <a16:creationId xmlns:a16="http://schemas.microsoft.com/office/drawing/2014/main" xmlns="" id="{73073737-E7AA-4A77-AF7F-BCB0E39084AD}"/>
+                <a16:creationId xmlns="" xmlns:a16="http://schemas.microsoft.com/office/drawing/2014/main" id="{73073737-E7AA-4A77-AF7F-BCB0E39084AD}"/>
               </a:ext>
             </a:extLst>
           </p:cNvPr>
@@ -2078,7 +2078,7 @@
           <p:cNvPr id="3" name="Text Placeholder 2">
             <a:extLst>
               <a:ext uri="{FF2B5EF4-FFF2-40B4-BE49-F238E27FC236}">
-                <a16:creationId xmlns:a16="http://schemas.microsoft.com/office/drawing/2014/main" xmlns="" id="{CA96E096-0255-4086-9035-A63535906FF5}"/>
+                <a16:creationId xmlns="" xmlns:a16="http://schemas.microsoft.com/office/drawing/2014/main" id="{CA96E096-0255-4086-9035-A63535906FF5}"/>
               </a:ext>
             </a:extLst>
           </p:cNvPr>
@@ -2149,7 +2149,7 @@
           <p:cNvPr id="4" name="Content Placeholder 3">
             <a:extLst>
               <a:ext uri="{FF2B5EF4-FFF2-40B4-BE49-F238E27FC236}">
-                <a16:creationId xmlns:a16="http://schemas.microsoft.com/office/drawing/2014/main" xmlns="" id="{3437967A-F630-4562-994C-1C8CDD8258BC}"/>
+                <a16:creationId xmlns="" xmlns:a16="http://schemas.microsoft.com/office/drawing/2014/main" id="{3437967A-F630-4562-994C-1C8CDD8258BC}"/>
               </a:ext>
             </a:extLst>
           </p:cNvPr>
@@ -2211,7 +2211,7 @@
           <p:cNvPr id="5" name="Text Placeholder 4">
             <a:extLst>
               <a:ext uri="{FF2B5EF4-FFF2-40B4-BE49-F238E27FC236}">
-                <a16:creationId xmlns:a16="http://schemas.microsoft.com/office/drawing/2014/main" xmlns="" id="{C187920C-D647-4D12-8724-F4AC8CAFD5DB}"/>
+                <a16:creationId xmlns="" xmlns:a16="http://schemas.microsoft.com/office/drawing/2014/main" id="{C187920C-D647-4D12-8724-F4AC8CAFD5DB}"/>
               </a:ext>
             </a:extLst>
           </p:cNvPr>
@@ -2282,7 +2282,7 @@
           <p:cNvPr id="6" name="Content Placeholder 5">
             <a:extLst>
               <a:ext uri="{FF2B5EF4-FFF2-40B4-BE49-F238E27FC236}">
-                <a16:creationId xmlns:a16="http://schemas.microsoft.com/office/drawing/2014/main" xmlns="" id="{20E33A59-014F-4CCE-81F9-97B02615123A}"/>
+                <a16:creationId xmlns="" xmlns:a16="http://schemas.microsoft.com/office/drawing/2014/main" id="{20E33A59-014F-4CCE-81F9-97B02615123A}"/>
               </a:ext>
             </a:extLst>
           </p:cNvPr>
@@ -2344,7 +2344,7 @@
           <p:cNvPr id="7" name="Date Placeholder 6">
             <a:extLst>
               <a:ext uri="{FF2B5EF4-FFF2-40B4-BE49-F238E27FC236}">
-                <a16:creationId xmlns:a16="http://schemas.microsoft.com/office/drawing/2014/main" xmlns="" id="{4BA08CB2-C117-447E-A916-0D66CF4D8AD2}"/>
+                <a16:creationId xmlns="" xmlns:a16="http://schemas.microsoft.com/office/drawing/2014/main" id="{4BA08CB2-C117-447E-A916-0D66CF4D8AD2}"/>
               </a:ext>
             </a:extLst>
           </p:cNvPr>
@@ -2362,7 +2362,7 @@
           <a:p>
             <a:fld id="{3C4DF5B9-6226-4C75-9420-E8D17C4C152E}" type="datetimeFigureOut">
               <a:rPr lang="en-US" smtClean="0"/>
-              <a:t>10/11/20</a:t>
+              <a:t>11/20/20</a:t>
             </a:fld>
             <a:endParaRPr lang="en-US"/>
           </a:p>
@@ -2373,7 +2373,7 @@
           <p:cNvPr id="8" name="Footer Placeholder 7">
             <a:extLst>
               <a:ext uri="{FF2B5EF4-FFF2-40B4-BE49-F238E27FC236}">
-                <a16:creationId xmlns:a16="http://schemas.microsoft.com/office/drawing/2014/main" xmlns="" id="{D29D0CA4-543C-4E0A-A731-7C56C357D378}"/>
+                <a16:creationId xmlns="" xmlns:a16="http://schemas.microsoft.com/office/drawing/2014/main" id="{D29D0CA4-543C-4E0A-A731-7C56C357D378}"/>
               </a:ext>
             </a:extLst>
           </p:cNvPr>
@@ -2398,7 +2398,7 @@
           <p:cNvPr id="9" name="Slide Number Placeholder 8">
             <a:extLst>
               <a:ext uri="{FF2B5EF4-FFF2-40B4-BE49-F238E27FC236}">
-                <a16:creationId xmlns:a16="http://schemas.microsoft.com/office/drawing/2014/main" xmlns="" id="{C7257B18-ED85-4692-AE50-1FA346CCC97C}"/>
+                <a16:creationId xmlns="" xmlns:a16="http://schemas.microsoft.com/office/drawing/2014/main" id="{C7257B18-ED85-4692-AE50-1FA346CCC97C}"/>
               </a:ext>
             </a:extLst>
           </p:cNvPr>
@@ -2457,7 +2457,7 @@
           <p:cNvPr id="2" name="Title 1">
             <a:extLst>
               <a:ext uri="{FF2B5EF4-FFF2-40B4-BE49-F238E27FC236}">
-                <a16:creationId xmlns:a16="http://schemas.microsoft.com/office/drawing/2014/main" xmlns="" id="{97579879-9EC8-4EA4-A995-D07D768E4F84}"/>
+                <a16:creationId xmlns="" xmlns:a16="http://schemas.microsoft.com/office/drawing/2014/main" id="{97579879-9EC8-4EA4-A995-D07D768E4F84}"/>
               </a:ext>
             </a:extLst>
           </p:cNvPr>
@@ -2485,7 +2485,7 @@
           <p:cNvPr id="3" name="Date Placeholder 2">
             <a:extLst>
               <a:ext uri="{FF2B5EF4-FFF2-40B4-BE49-F238E27FC236}">
-                <a16:creationId xmlns:a16="http://schemas.microsoft.com/office/drawing/2014/main" xmlns="" id="{56292A33-2D1F-4823-B252-99E97C0D8D03}"/>
+                <a16:creationId xmlns="" xmlns:a16="http://schemas.microsoft.com/office/drawing/2014/main" id="{56292A33-2D1F-4823-B252-99E97C0D8D03}"/>
               </a:ext>
             </a:extLst>
           </p:cNvPr>
@@ -2503,7 +2503,7 @@
           <a:p>
             <a:fld id="{3C4DF5B9-6226-4C75-9420-E8D17C4C152E}" type="datetimeFigureOut">
               <a:rPr lang="en-US" smtClean="0"/>
-              <a:t>10/11/20</a:t>
+              <a:t>11/20/20</a:t>
             </a:fld>
             <a:endParaRPr lang="en-US"/>
           </a:p>
@@ -2514,7 +2514,7 @@
           <p:cNvPr id="4" name="Footer Placeholder 3">
             <a:extLst>
               <a:ext uri="{FF2B5EF4-FFF2-40B4-BE49-F238E27FC236}">
-                <a16:creationId xmlns:a16="http://schemas.microsoft.com/office/drawing/2014/main" xmlns="" id="{24C7B68E-6BE9-4ED5-B7D3-D74B3AC38C24}"/>
+                <a16:creationId xmlns="" xmlns:a16="http://schemas.microsoft.com/office/drawing/2014/main" id="{24C7B68E-6BE9-4ED5-B7D3-D74B3AC38C24}"/>
               </a:ext>
             </a:extLst>
           </p:cNvPr>
@@ -2539,7 +2539,7 @@
           <p:cNvPr id="5" name="Slide Number Placeholder 4">
             <a:extLst>
               <a:ext uri="{FF2B5EF4-FFF2-40B4-BE49-F238E27FC236}">
-                <a16:creationId xmlns:a16="http://schemas.microsoft.com/office/drawing/2014/main" xmlns="" id="{260CC1B9-4FFC-478E-B58E-91CC1AF27BED}"/>
+                <a16:creationId xmlns="" xmlns:a16="http://schemas.microsoft.com/office/drawing/2014/main" id="{260CC1B9-4FFC-478E-B58E-91CC1AF27BED}"/>
               </a:ext>
             </a:extLst>
           </p:cNvPr>
@@ -2598,7 +2598,7 @@
           <p:cNvPr id="2" name="Date Placeholder 1">
             <a:extLst>
               <a:ext uri="{FF2B5EF4-FFF2-40B4-BE49-F238E27FC236}">
-                <a16:creationId xmlns:a16="http://schemas.microsoft.com/office/drawing/2014/main" xmlns="" id="{36A884B7-E95E-4524-9970-595815250247}"/>
+                <a16:creationId xmlns="" xmlns:a16="http://schemas.microsoft.com/office/drawing/2014/main" id="{36A884B7-E95E-4524-9970-595815250247}"/>
               </a:ext>
             </a:extLst>
           </p:cNvPr>
@@ -2616,7 +2616,7 @@
           <a:p>
             <a:fld id="{3C4DF5B9-6226-4C75-9420-E8D17C4C152E}" type="datetimeFigureOut">
               <a:rPr lang="en-US" smtClean="0"/>
-              <a:t>10/11/20</a:t>
+              <a:t>11/20/20</a:t>
             </a:fld>
             <a:endParaRPr lang="en-US"/>
           </a:p>
@@ -2627,7 +2627,7 @@
           <p:cNvPr id="3" name="Footer Placeholder 2">
             <a:extLst>
               <a:ext uri="{FF2B5EF4-FFF2-40B4-BE49-F238E27FC236}">
-                <a16:creationId xmlns:a16="http://schemas.microsoft.com/office/drawing/2014/main" xmlns="" id="{85AF3E20-0700-4A4C-9B49-598F14486D7F}"/>
+                <a16:creationId xmlns="" xmlns:a16="http://schemas.microsoft.com/office/drawing/2014/main" id="{85AF3E20-0700-4A4C-9B49-598F14486D7F}"/>
               </a:ext>
             </a:extLst>
           </p:cNvPr>
@@ -2652,7 +2652,7 @@
           <p:cNvPr id="4" name="Slide Number Placeholder 3">
             <a:extLst>
               <a:ext uri="{FF2B5EF4-FFF2-40B4-BE49-F238E27FC236}">
-                <a16:creationId xmlns:a16="http://schemas.microsoft.com/office/drawing/2014/main" xmlns="" id="{2FBE44B5-BA8F-4623-BD93-F657EB2CE23E}"/>
+                <a16:creationId xmlns="" xmlns:a16="http://schemas.microsoft.com/office/drawing/2014/main" id="{2FBE44B5-BA8F-4623-BD93-F657EB2CE23E}"/>
               </a:ext>
             </a:extLst>
           </p:cNvPr>
@@ -2711,7 +2711,7 @@
           <p:cNvPr id="2" name="Title 1">
             <a:extLst>
               <a:ext uri="{FF2B5EF4-FFF2-40B4-BE49-F238E27FC236}">
-                <a16:creationId xmlns:a16="http://schemas.microsoft.com/office/drawing/2014/main" xmlns="" id="{C9DB0524-F63C-4D3B-A166-48089E0CC249}"/>
+                <a16:creationId xmlns="" xmlns:a16="http://schemas.microsoft.com/office/drawing/2014/main" id="{C9DB0524-F63C-4D3B-A166-48089E0CC249}"/>
               </a:ext>
             </a:extLst>
           </p:cNvPr>
@@ -2748,7 +2748,7 @@
           <p:cNvPr id="3" name="Content Placeholder 2">
             <a:extLst>
               <a:ext uri="{FF2B5EF4-FFF2-40B4-BE49-F238E27FC236}">
-                <a16:creationId xmlns:a16="http://schemas.microsoft.com/office/drawing/2014/main" xmlns="" id="{ED01F34B-9227-44D9-8AAC-9F4D9BCC45B9}"/>
+                <a16:creationId xmlns="" xmlns:a16="http://schemas.microsoft.com/office/drawing/2014/main" id="{ED01F34B-9227-44D9-8AAC-9F4D9BCC45B9}"/>
               </a:ext>
             </a:extLst>
           </p:cNvPr>
@@ -2838,7 +2838,7 @@
           <p:cNvPr id="4" name="Text Placeholder 3">
             <a:extLst>
               <a:ext uri="{FF2B5EF4-FFF2-40B4-BE49-F238E27FC236}">
-                <a16:creationId xmlns:a16="http://schemas.microsoft.com/office/drawing/2014/main" xmlns="" id="{FC4B3FC6-BDE7-458E-A0D4-3B5CDEE2A2CF}"/>
+                <a16:creationId xmlns="" xmlns:a16="http://schemas.microsoft.com/office/drawing/2014/main" id="{FC4B3FC6-BDE7-458E-A0D4-3B5CDEE2A2CF}"/>
               </a:ext>
             </a:extLst>
           </p:cNvPr>
@@ -2909,7 +2909,7 @@
           <p:cNvPr id="5" name="Date Placeholder 4">
             <a:extLst>
               <a:ext uri="{FF2B5EF4-FFF2-40B4-BE49-F238E27FC236}">
-                <a16:creationId xmlns:a16="http://schemas.microsoft.com/office/drawing/2014/main" xmlns="" id="{D668A527-DB80-4A46-B718-1AA0F646E7FC}"/>
+                <a16:creationId xmlns="" xmlns:a16="http://schemas.microsoft.com/office/drawing/2014/main" id="{D668A527-DB80-4A46-B718-1AA0F646E7FC}"/>
               </a:ext>
             </a:extLst>
           </p:cNvPr>
@@ -2927,7 +2927,7 @@
           <a:p>
             <a:fld id="{3C4DF5B9-6226-4C75-9420-E8D17C4C152E}" type="datetimeFigureOut">
               <a:rPr lang="en-US" smtClean="0"/>
-              <a:t>10/11/20</a:t>
+              <a:t>11/20/20</a:t>
             </a:fld>
             <a:endParaRPr lang="en-US"/>
           </a:p>
@@ -2938,7 +2938,7 @@
           <p:cNvPr id="6" name="Footer Placeholder 5">
             <a:extLst>
               <a:ext uri="{FF2B5EF4-FFF2-40B4-BE49-F238E27FC236}">
-                <a16:creationId xmlns:a16="http://schemas.microsoft.com/office/drawing/2014/main" xmlns="" id="{C3912AFE-009E-4B98-A758-6A9889031F4D}"/>
+                <a16:creationId xmlns="" xmlns:a16="http://schemas.microsoft.com/office/drawing/2014/main" id="{C3912AFE-009E-4B98-A758-6A9889031F4D}"/>
               </a:ext>
             </a:extLst>
           </p:cNvPr>
@@ -2963,7 +2963,7 @@
           <p:cNvPr id="7" name="Slide Number Placeholder 6">
             <a:extLst>
               <a:ext uri="{FF2B5EF4-FFF2-40B4-BE49-F238E27FC236}">
-                <a16:creationId xmlns:a16="http://schemas.microsoft.com/office/drawing/2014/main" xmlns="" id="{E725B9B9-1722-4441-BC9D-A99F4787E50A}"/>
+                <a16:creationId xmlns="" xmlns:a16="http://schemas.microsoft.com/office/drawing/2014/main" id="{E725B9B9-1722-4441-BC9D-A99F4787E50A}"/>
               </a:ext>
             </a:extLst>
           </p:cNvPr>
@@ -3022,7 +3022,7 @@
           <p:cNvPr id="2" name="Title 1">
             <a:extLst>
               <a:ext uri="{FF2B5EF4-FFF2-40B4-BE49-F238E27FC236}">
-                <a16:creationId xmlns:a16="http://schemas.microsoft.com/office/drawing/2014/main" xmlns="" id="{57ED2D60-7517-4620-8434-71A1B86C2B3A}"/>
+                <a16:creationId xmlns="" xmlns:a16="http://schemas.microsoft.com/office/drawing/2014/main" id="{57ED2D60-7517-4620-8434-71A1B86C2B3A}"/>
               </a:ext>
             </a:extLst>
           </p:cNvPr>
@@ -3059,7 +3059,7 @@
           <p:cNvPr id="3" name="Picture Placeholder 2">
             <a:extLst>
               <a:ext uri="{FF2B5EF4-FFF2-40B4-BE49-F238E27FC236}">
-                <a16:creationId xmlns:a16="http://schemas.microsoft.com/office/drawing/2014/main" xmlns="" id="{6F950A2E-0AC2-40B7-B734-6E908DE2D931}"/>
+                <a16:creationId xmlns="" xmlns:a16="http://schemas.microsoft.com/office/drawing/2014/main" id="{6F950A2E-0AC2-40B7-B734-6E908DE2D931}"/>
               </a:ext>
             </a:extLst>
           </p:cNvPr>
@@ -3126,7 +3126,7 @@
           <p:cNvPr id="4" name="Text Placeholder 3">
             <a:extLst>
               <a:ext uri="{FF2B5EF4-FFF2-40B4-BE49-F238E27FC236}">
-                <a16:creationId xmlns:a16="http://schemas.microsoft.com/office/drawing/2014/main" xmlns="" id="{9D7D254B-29A8-4412-A23A-AB503F4020FD}"/>
+                <a16:creationId xmlns="" xmlns:a16="http://schemas.microsoft.com/office/drawing/2014/main" id="{9D7D254B-29A8-4412-A23A-AB503F4020FD}"/>
               </a:ext>
             </a:extLst>
           </p:cNvPr>
@@ -3197,7 +3197,7 @@
           <p:cNvPr id="5" name="Date Placeholder 4">
             <a:extLst>
               <a:ext uri="{FF2B5EF4-FFF2-40B4-BE49-F238E27FC236}">
-                <a16:creationId xmlns:a16="http://schemas.microsoft.com/office/drawing/2014/main" xmlns="" id="{D910A96D-2768-4D80-9060-4598900E3F22}"/>
+                <a16:creationId xmlns="" xmlns:a16="http://schemas.microsoft.com/office/drawing/2014/main" id="{D910A96D-2768-4D80-9060-4598900E3F22}"/>
               </a:ext>
             </a:extLst>
           </p:cNvPr>
@@ -3215,7 +3215,7 @@
           <a:p>
             <a:fld id="{3C4DF5B9-6226-4C75-9420-E8D17C4C152E}" type="datetimeFigureOut">
               <a:rPr lang="en-US" smtClean="0"/>
-              <a:t>10/11/20</a:t>
+              <a:t>11/20/20</a:t>
             </a:fld>
             <a:endParaRPr lang="en-US"/>
           </a:p>
@@ -3226,7 +3226,7 @@
           <p:cNvPr id="6" name="Footer Placeholder 5">
             <a:extLst>
               <a:ext uri="{FF2B5EF4-FFF2-40B4-BE49-F238E27FC236}">
-                <a16:creationId xmlns:a16="http://schemas.microsoft.com/office/drawing/2014/main" xmlns="" id="{40442613-6820-4E02-8767-4A56738C19E4}"/>
+                <a16:creationId xmlns="" xmlns:a16="http://schemas.microsoft.com/office/drawing/2014/main" id="{40442613-6820-4E02-8767-4A56738C19E4}"/>
               </a:ext>
             </a:extLst>
           </p:cNvPr>
@@ -3251,7 +3251,7 @@
           <p:cNvPr id="7" name="Slide Number Placeholder 6">
             <a:extLst>
               <a:ext uri="{FF2B5EF4-FFF2-40B4-BE49-F238E27FC236}">
-                <a16:creationId xmlns:a16="http://schemas.microsoft.com/office/drawing/2014/main" xmlns="" id="{CB18FC9A-02F5-433E-8828-4CEAA332B5FA}"/>
+                <a16:creationId xmlns="" xmlns:a16="http://schemas.microsoft.com/office/drawing/2014/main" id="{CB18FC9A-02F5-433E-8828-4CEAA332B5FA}"/>
               </a:ext>
             </a:extLst>
           </p:cNvPr>
@@ -3315,7 +3315,7 @@
           <p:cNvPr id="2" name="Title Placeholder 1">
             <a:extLst>
               <a:ext uri="{FF2B5EF4-FFF2-40B4-BE49-F238E27FC236}">
-                <a16:creationId xmlns:a16="http://schemas.microsoft.com/office/drawing/2014/main" xmlns="" id="{CD4FA33A-BDCE-4DA7-A39F-6ADCDBC997EC}"/>
+                <a16:creationId xmlns="" xmlns:a16="http://schemas.microsoft.com/office/drawing/2014/main" id="{CD4FA33A-BDCE-4DA7-A39F-6ADCDBC997EC}"/>
               </a:ext>
             </a:extLst>
           </p:cNvPr>
@@ -3353,7 +3353,7 @@
           <p:cNvPr id="3" name="Text Placeholder 2">
             <a:extLst>
               <a:ext uri="{FF2B5EF4-FFF2-40B4-BE49-F238E27FC236}">
-                <a16:creationId xmlns:a16="http://schemas.microsoft.com/office/drawing/2014/main" xmlns="" id="{86CC21BF-88DD-4AD5-BAA9-8D109B473101}"/>
+                <a16:creationId xmlns="" xmlns:a16="http://schemas.microsoft.com/office/drawing/2014/main" id="{86CC21BF-88DD-4AD5-BAA9-8D109B473101}"/>
               </a:ext>
             </a:extLst>
           </p:cNvPr>
@@ -3420,7 +3420,7 @@
           <p:cNvPr id="4" name="Date Placeholder 3">
             <a:extLst>
               <a:ext uri="{FF2B5EF4-FFF2-40B4-BE49-F238E27FC236}">
-                <a16:creationId xmlns:a16="http://schemas.microsoft.com/office/drawing/2014/main" xmlns="" id="{9AAC3D1B-D615-4DE2-AC94-EDCE63FF4600}"/>
+                <a16:creationId xmlns="" xmlns:a16="http://schemas.microsoft.com/office/drawing/2014/main" id="{9AAC3D1B-D615-4DE2-AC94-EDCE63FF4600}"/>
               </a:ext>
             </a:extLst>
           </p:cNvPr>
@@ -3456,7 +3456,7 @@
           <a:p>
             <a:fld id="{3C4DF5B9-6226-4C75-9420-E8D17C4C152E}" type="datetimeFigureOut">
               <a:rPr lang="en-US" smtClean="0"/>
-              <a:t>10/11/20</a:t>
+              <a:t>11/20/20</a:t>
             </a:fld>
             <a:endParaRPr lang="en-US"/>
           </a:p>
@@ -3467,7 +3467,7 @@
           <p:cNvPr id="5" name="Footer Placeholder 4">
             <a:extLst>
               <a:ext uri="{FF2B5EF4-FFF2-40B4-BE49-F238E27FC236}">
-                <a16:creationId xmlns:a16="http://schemas.microsoft.com/office/drawing/2014/main" xmlns="" id="{A2FD67E6-1A57-4987-A830-E077F3332059}"/>
+                <a16:creationId xmlns="" xmlns:a16="http://schemas.microsoft.com/office/drawing/2014/main" id="{A2FD67E6-1A57-4987-A830-E077F3332059}"/>
               </a:ext>
             </a:extLst>
           </p:cNvPr>
@@ -3510,7 +3510,7 @@
           <p:cNvPr id="6" name="Slide Number Placeholder 5">
             <a:extLst>
               <a:ext uri="{FF2B5EF4-FFF2-40B4-BE49-F238E27FC236}">
-                <a16:creationId xmlns:a16="http://schemas.microsoft.com/office/drawing/2014/main" xmlns="" id="{3BB1710F-7A62-4E14-A523-79DB7AF3578C}"/>
+                <a16:creationId xmlns="" xmlns:a16="http://schemas.microsoft.com/office/drawing/2014/main" id="{3BB1710F-7A62-4E14-A523-79DB7AF3578C}"/>
               </a:ext>
             </a:extLst>
           </p:cNvPr>
@@ -4077,7 +4077,7 @@
           <p:cNvPr id="2" name="Title 1">
             <a:extLst>
               <a:ext uri="{FF2B5EF4-FFF2-40B4-BE49-F238E27FC236}">
-                <a16:creationId xmlns:a16="http://schemas.microsoft.com/office/drawing/2014/main" xmlns="" id="{1B4764F1-FECB-4B75-9A14-126E834E466D}"/>
+                <a16:creationId xmlns="" xmlns:a16="http://schemas.microsoft.com/office/drawing/2014/main" id="{1B4764F1-FECB-4B75-9A14-126E834E466D}"/>
               </a:ext>
             </a:extLst>
           </p:cNvPr>
@@ -4106,7 +4106,7 @@
           <p:cNvPr id="3" name="Content Placeholder 2">
             <a:extLst>
               <a:ext uri="{FF2B5EF4-FFF2-40B4-BE49-F238E27FC236}">
-                <a16:creationId xmlns:a16="http://schemas.microsoft.com/office/drawing/2014/main" xmlns="" id="{928EF53E-3BD0-42CF-8235-385BA7C36220}"/>
+                <a16:creationId xmlns="" xmlns:a16="http://schemas.microsoft.com/office/drawing/2014/main" id="{928EF53E-3BD0-42CF-8235-385BA7C36220}"/>
               </a:ext>
             </a:extLst>
           </p:cNvPr>
@@ -4200,7 +4200,7 @@
           <p:cNvPr id="2" name="Title 1">
             <a:extLst>
               <a:ext uri="{FF2B5EF4-FFF2-40B4-BE49-F238E27FC236}">
-                <a16:creationId xmlns:a16="http://schemas.microsoft.com/office/drawing/2014/main" xmlns="" id="{0458812E-D0EF-4592-8D50-8A836B143E42}"/>
+                <a16:creationId xmlns="" xmlns:a16="http://schemas.microsoft.com/office/drawing/2014/main" id="{0458812E-D0EF-4592-8D50-8A836B143E42}"/>
               </a:ext>
             </a:extLst>
           </p:cNvPr>
@@ -4297,7 +4297,7 @@
           <p:cNvPr id="3" name="Content Placeholder 2">
             <a:extLst>
               <a:ext uri="{FF2B5EF4-FFF2-40B4-BE49-F238E27FC236}">
-                <a16:creationId xmlns:a16="http://schemas.microsoft.com/office/drawing/2014/main" xmlns="" id="{6DC4BE4C-9368-4E1B-AC76-88337059AD3D}"/>
+                <a16:creationId xmlns="" xmlns:a16="http://schemas.microsoft.com/office/drawing/2014/main" id="{6DC4BE4C-9368-4E1B-AC76-88337059AD3D}"/>
               </a:ext>
             </a:extLst>
           </p:cNvPr>
@@ -4358,7 +4358,7 @@
           <p:cNvPr id="2" name="Title 1">
             <a:extLst>
               <a:ext uri="{FF2B5EF4-FFF2-40B4-BE49-F238E27FC236}">
-                <a16:creationId xmlns:a16="http://schemas.microsoft.com/office/drawing/2014/main" xmlns="" id="{B737B787-9675-49F4-BB53-DFA1AB9B71D6}"/>
+                <a16:creationId xmlns="" xmlns:a16="http://schemas.microsoft.com/office/drawing/2014/main" id="{B737B787-9675-49F4-BB53-DFA1AB9B71D6}"/>
               </a:ext>
             </a:extLst>
           </p:cNvPr>
@@ -4387,7 +4387,7 @@
           <p:cNvPr id="3" name="Content Placeholder 2">
             <a:extLst>
               <a:ext uri="{FF2B5EF4-FFF2-40B4-BE49-F238E27FC236}">
-                <a16:creationId xmlns:a16="http://schemas.microsoft.com/office/drawing/2014/main" xmlns="" id="{8FEA94E1-C2DC-488F-A46D-BE2DBBE9C7F6}"/>
+                <a16:creationId xmlns="" xmlns:a16="http://schemas.microsoft.com/office/drawing/2014/main" id="{8FEA94E1-C2DC-488F-A46D-BE2DBBE9C7F6}"/>
               </a:ext>
             </a:extLst>
           </p:cNvPr>
@@ -4451,7 +4451,7 @@
           <p:cNvPr id="2" name="Title 1">
             <a:extLst>
               <a:ext uri="{FF2B5EF4-FFF2-40B4-BE49-F238E27FC236}">
-                <a16:creationId xmlns:a16="http://schemas.microsoft.com/office/drawing/2014/main" xmlns="" id="{7C4EA4F9-2CFF-4842-82DB-21B4127B8D3C}"/>
+                <a16:creationId xmlns="" xmlns:a16="http://schemas.microsoft.com/office/drawing/2014/main" id="{7C4EA4F9-2CFF-4842-82DB-21B4127B8D3C}"/>
               </a:ext>
             </a:extLst>
           </p:cNvPr>
@@ -4487,7 +4487,7 @@
           <p:cNvPr id="5" name="Content Placeholder 4" descr="A screenshot of a computer&#10;&#10;Description automatically generated">
             <a:extLst>
               <a:ext uri="{FF2B5EF4-FFF2-40B4-BE49-F238E27FC236}">
-                <a16:creationId xmlns:a16="http://schemas.microsoft.com/office/drawing/2014/main" xmlns="" id="{1588775F-A18E-4561-9815-8073F4D64F10}"/>
+                <a16:creationId xmlns="" xmlns:a16="http://schemas.microsoft.com/office/drawing/2014/main" id="{1588775F-A18E-4561-9815-8073F4D64F10}"/>
               </a:ext>
             </a:extLst>
           </p:cNvPr>
@@ -4552,37 +4552,12 @@
           <a:chExt cx="0" cy="0"/>
         </a:xfrm>
       </p:grpSpPr>
-      <p:sp>
-        <p:nvSpPr>
-          <p:cNvPr id="2" name="Title 1">
-            <a:extLst>
-              <a:ext uri="{FF2B5EF4-FFF2-40B4-BE49-F238E27FC236}">
-                <a16:creationId xmlns:a16="http://schemas.microsoft.com/office/drawing/2014/main" xmlns="" id="{B92E8A27-4C54-4A5D-9E0E-D5770B169C03}"/>
-              </a:ext>
-            </a:extLst>
-          </p:cNvPr>
-          <p:cNvSpPr>
-            <a:spLocks noGrp="1"/>
-          </p:cNvSpPr>
-          <p:nvPr>
-            <p:ph type="title"/>
-          </p:nvPr>
-        </p:nvSpPr>
-        <p:spPr/>
-        <p:txBody>
-          <a:bodyPr/>
-          <a:lstStyle/>
-          <a:p>
-            <a:endParaRPr lang="en-US"/>
-          </a:p>
-        </p:txBody>
-      </p:sp>
       <p:pic>
         <p:nvPicPr>
           <p:cNvPr id="5" name="Content Placeholder 4" descr="A screenshot of a computer&#10;&#10;Description automatically generated">
             <a:extLst>
               <a:ext uri="{FF2B5EF4-FFF2-40B4-BE49-F238E27FC236}">
-                <a16:creationId xmlns:a16="http://schemas.microsoft.com/office/drawing/2014/main" xmlns="" id="{986BB5D6-2EE5-4698-B45F-CD57D94217B5}"/>
+                <a16:creationId xmlns="" xmlns:a16="http://schemas.microsoft.com/office/drawing/2014/main" id="{986BB5D6-2EE5-4698-B45F-CD57D94217B5}"/>
               </a:ext>
             </a:extLst>
           </p:cNvPr>
@@ -4647,7 +4622,7 @@
           <p:cNvPr id="2" name="Title 1">
             <a:extLst>
               <a:ext uri="{FF2B5EF4-FFF2-40B4-BE49-F238E27FC236}">
-                <a16:creationId xmlns:a16="http://schemas.microsoft.com/office/drawing/2014/main" xmlns="" id="{21B7821F-0927-46A2-AB53-699DE44B1C85}"/>
+                <a16:creationId xmlns="" xmlns:a16="http://schemas.microsoft.com/office/drawing/2014/main" id="{21B7821F-0927-46A2-AB53-699DE44B1C85}"/>
               </a:ext>
             </a:extLst>
           </p:cNvPr>
@@ -4672,7 +4647,7 @@
           <p:cNvPr id="3" name="Content Placeholder 2">
             <a:extLst>
               <a:ext uri="{FF2B5EF4-FFF2-40B4-BE49-F238E27FC236}">
-                <a16:creationId xmlns:a16="http://schemas.microsoft.com/office/drawing/2014/main" xmlns="" id="{08D349F9-9F08-4186-B9E1-38BF346F2D86}"/>
+                <a16:creationId xmlns="" xmlns:a16="http://schemas.microsoft.com/office/drawing/2014/main" id="{08D349F9-9F08-4186-B9E1-38BF346F2D86}"/>
               </a:ext>
             </a:extLst>
           </p:cNvPr>
@@ -4727,7 +4702,7 @@
           <p:cNvPr id="2" name="Title 1">
             <a:extLst>
               <a:ext uri="{FF2B5EF4-FFF2-40B4-BE49-F238E27FC236}">
-                <a16:creationId xmlns:a16="http://schemas.microsoft.com/office/drawing/2014/main" xmlns="" id="{4D57E1C5-520E-4FA3-A586-E040AA660E72}"/>
+                <a16:creationId xmlns="" xmlns:a16="http://schemas.microsoft.com/office/drawing/2014/main" id="{4D57E1C5-520E-4FA3-A586-E040AA660E72}"/>
               </a:ext>
             </a:extLst>
           </p:cNvPr>
@@ -4761,7 +4736,7 @@
           <p:cNvPr id="3" name="Content Placeholder 2">
             <a:extLst>
               <a:ext uri="{FF2B5EF4-FFF2-40B4-BE49-F238E27FC236}">
-                <a16:creationId xmlns:a16="http://schemas.microsoft.com/office/drawing/2014/main" xmlns="" id="{7123B0BB-6D89-4802-861E-CA9648FF6379}"/>
+                <a16:creationId xmlns="" xmlns:a16="http://schemas.microsoft.com/office/drawing/2014/main" id="{7123B0BB-6D89-4802-861E-CA9648FF6379}"/>
               </a:ext>
             </a:extLst>
           </p:cNvPr>
@@ -4889,23 +4864,7 @@
                 <a:ea typeface="Times New Roman" charset="0"/>
                 <a:cs typeface="Times New Roman" charset="0"/>
               </a:rPr>
-              <a:t>CC </a:t>
-            </a:r>
-            <a:r>
-              <a:rPr lang="en-US" sz="2800" dirty="0">
-                <a:latin typeface="Times New Roman" charset="0"/>
-                <a:ea typeface="Times New Roman" charset="0"/>
-                <a:cs typeface="Times New Roman" charset="0"/>
-              </a:rPr>
-              <a:t>BY-SA </a:t>
-            </a:r>
-            <a:r>
-              <a:rPr lang="en-US" sz="2800" dirty="0">
-                <a:latin typeface="Times New Roman" charset="0"/>
-                <a:ea typeface="Times New Roman" charset="0"/>
-                <a:cs typeface="Times New Roman" charset="0"/>
-              </a:rPr>
-              <a:t>4.0. To view a copy of this license, visit </a:t>
+              <a:t>CC BY-SA 4.0. To view a copy of this license, visit </a:t>
             </a:r>
             <a:r>
               <a:rPr lang="en-US" sz="2800" dirty="0">
@@ -4914,16 +4873,7 @@
                 <a:cs typeface="Times New Roman" charset="0"/>
                 <a:hlinkClick r:id="rId2"/>
               </a:rPr>
-              <a:t>https://</a:t>
-            </a:r>
-            <a:r>
-              <a:rPr lang="en-US" sz="2800" dirty="0">
-                <a:latin typeface="Times New Roman" charset="0"/>
-                <a:ea typeface="Times New Roman" charset="0"/>
-                <a:cs typeface="Times New Roman" charset="0"/>
-                <a:hlinkClick r:id="rId2"/>
-              </a:rPr>
-              <a:t>creativecommons.org/licenses/by-sa/4.0</a:t>
+              <a:t>https://creativecommons.org/licenses/by-sa/4.0</a:t>
             </a:r>
             <a:r>
               <a:rPr lang="en-US" sz="2800" dirty="0">
@@ -5109,7 +5059,7 @@
           <p:cNvPr id="2" name="Title 1">
             <a:extLst>
               <a:ext uri="{FF2B5EF4-FFF2-40B4-BE49-F238E27FC236}">
-                <a16:creationId xmlns:a16="http://schemas.microsoft.com/office/drawing/2014/main" xmlns="" id="{56DE7892-6AAD-4E4B-B485-21B5ECB7EC8C}"/>
+                <a16:creationId xmlns="" xmlns:a16="http://schemas.microsoft.com/office/drawing/2014/main" id="{56DE7892-6AAD-4E4B-B485-21B5ECB7EC8C}"/>
               </a:ext>
             </a:extLst>
           </p:cNvPr>
@@ -5143,7 +5093,7 @@
           <p:cNvPr id="3" name="Content Placeholder 2">
             <a:extLst>
               <a:ext uri="{FF2B5EF4-FFF2-40B4-BE49-F238E27FC236}">
-                <a16:creationId xmlns:a16="http://schemas.microsoft.com/office/drawing/2014/main" xmlns="" id="{BF115787-C7C5-40FF-9F79-31FD29A6B6B4}"/>
+                <a16:creationId xmlns="" xmlns:a16="http://schemas.microsoft.com/office/drawing/2014/main" id="{BF115787-C7C5-40FF-9F79-31FD29A6B6B4}"/>
               </a:ext>
             </a:extLst>
           </p:cNvPr>
@@ -5332,7 +5282,7 @@
           <p:cNvPr id="2" name="Title 1">
             <a:extLst>
               <a:ext uri="{FF2B5EF4-FFF2-40B4-BE49-F238E27FC236}">
-                <a16:creationId xmlns:a16="http://schemas.microsoft.com/office/drawing/2014/main" xmlns="" id="{B5AA7FA5-7F79-4362-84A7-947BBE478DC1}"/>
+                <a16:creationId xmlns="" xmlns:a16="http://schemas.microsoft.com/office/drawing/2014/main" id="{B5AA7FA5-7F79-4362-84A7-947BBE478DC1}"/>
               </a:ext>
             </a:extLst>
           </p:cNvPr>
@@ -5366,7 +5316,7 @@
           <p:cNvPr id="3" name="Content Placeholder 2">
             <a:extLst>
               <a:ext uri="{FF2B5EF4-FFF2-40B4-BE49-F238E27FC236}">
-                <a16:creationId xmlns:a16="http://schemas.microsoft.com/office/drawing/2014/main" xmlns="" id="{9914B3CA-33C5-47E9-B3FC-EEB1273603F5}"/>
+                <a16:creationId xmlns="" xmlns:a16="http://schemas.microsoft.com/office/drawing/2014/main" id="{9914B3CA-33C5-47E9-B3FC-EEB1273603F5}"/>
               </a:ext>
             </a:extLst>
           </p:cNvPr>
@@ -5478,7 +5428,7 @@
           <p:cNvPr id="2" name="Title 1">
             <a:extLst>
               <a:ext uri="{FF2B5EF4-FFF2-40B4-BE49-F238E27FC236}">
-                <a16:creationId xmlns:a16="http://schemas.microsoft.com/office/drawing/2014/main" xmlns="" id="{DCD523A4-4172-4CF3-87EF-55764807B741}"/>
+                <a16:creationId xmlns="" xmlns:a16="http://schemas.microsoft.com/office/drawing/2014/main" id="{DCD523A4-4172-4CF3-87EF-55764807B741}"/>
               </a:ext>
             </a:extLst>
           </p:cNvPr>
@@ -5514,7 +5464,7 @@
           <p:cNvPr id="4" name="Table 4">
             <a:extLst>
               <a:ext uri="{FF2B5EF4-FFF2-40B4-BE49-F238E27FC236}">
-                <a16:creationId xmlns:a16="http://schemas.microsoft.com/office/drawing/2014/main" xmlns="" id="{251C0C9B-8E40-4667-9FCE-EA58401C9B6D}"/>
+                <a16:creationId xmlns="" xmlns:a16="http://schemas.microsoft.com/office/drawing/2014/main" id="{251C0C9B-8E40-4667-9FCE-EA58401C9B6D}"/>
               </a:ext>
             </a:extLst>
           </p:cNvPr>
@@ -5544,21 +5494,21 @@
                 <a:gridCol w="3505199">
                   <a:extLst>
                     <a:ext uri="{9D8B030D-6E8A-4147-A177-3AD203B41FA5}">
-                      <a16:colId xmlns:a16="http://schemas.microsoft.com/office/drawing/2014/main" xmlns="" val="2498812653"/>
+                      <a16:colId xmlns="" xmlns:a16="http://schemas.microsoft.com/office/drawing/2014/main" val="2498812653"/>
                     </a:ext>
                   </a:extLst>
                 </a:gridCol>
                 <a:gridCol w="3505199">
                   <a:extLst>
                     <a:ext uri="{9D8B030D-6E8A-4147-A177-3AD203B41FA5}">
-                      <a16:colId xmlns:a16="http://schemas.microsoft.com/office/drawing/2014/main" xmlns="" val="1636506021"/>
+                      <a16:colId xmlns="" xmlns:a16="http://schemas.microsoft.com/office/drawing/2014/main" val="1636506021"/>
                     </a:ext>
                   </a:extLst>
                 </a:gridCol>
                 <a:gridCol w="3505199">
                   <a:extLst>
                     <a:ext uri="{9D8B030D-6E8A-4147-A177-3AD203B41FA5}">
-                      <a16:colId xmlns:a16="http://schemas.microsoft.com/office/drawing/2014/main" xmlns="" val="3911463009"/>
+                      <a16:colId xmlns="" xmlns:a16="http://schemas.microsoft.com/office/drawing/2014/main" val="3911463009"/>
                     </a:ext>
                   </a:extLst>
                 </a:gridCol>
@@ -5734,7 +5684,7 @@
                 </a:tc>
                 <a:extLst>
                   <a:ext uri="{0D108BD9-81ED-4DB2-BD59-A6C34878D82A}">
-                    <a16:rowId xmlns:a16="http://schemas.microsoft.com/office/drawing/2014/main" xmlns="" val="3268635304"/>
+                    <a16:rowId xmlns="" xmlns:a16="http://schemas.microsoft.com/office/drawing/2014/main" val="3268635304"/>
                   </a:ext>
                 </a:extLst>
               </a:tr>
@@ -5925,7 +5875,7 @@
                 </a:tc>
                 <a:extLst>
                   <a:ext uri="{0D108BD9-81ED-4DB2-BD59-A6C34878D82A}">
-                    <a16:rowId xmlns:a16="http://schemas.microsoft.com/office/drawing/2014/main" xmlns="" val="2197911722"/>
+                    <a16:rowId xmlns="" xmlns:a16="http://schemas.microsoft.com/office/drawing/2014/main" val="2197911722"/>
                   </a:ext>
                 </a:extLst>
               </a:tr>
@@ -6116,7 +6066,7 @@
                 </a:tc>
                 <a:extLst>
                   <a:ext uri="{0D108BD9-81ED-4DB2-BD59-A6C34878D82A}">
-                    <a16:rowId xmlns:a16="http://schemas.microsoft.com/office/drawing/2014/main" xmlns="" val="2652785360"/>
+                    <a16:rowId xmlns="" xmlns:a16="http://schemas.microsoft.com/office/drawing/2014/main" val="2652785360"/>
                   </a:ext>
                 </a:extLst>
               </a:tr>
@@ -6323,7 +6273,7 @@
                 </a:tc>
                 <a:extLst>
                   <a:ext uri="{0D108BD9-81ED-4DB2-BD59-A6C34878D82A}">
-                    <a16:rowId xmlns:a16="http://schemas.microsoft.com/office/drawing/2014/main" xmlns="" val="534654304"/>
+                    <a16:rowId xmlns="" xmlns:a16="http://schemas.microsoft.com/office/drawing/2014/main" val="534654304"/>
                   </a:ext>
                 </a:extLst>
               </a:tr>
@@ -6514,7 +6464,7 @@
                 </a:tc>
                 <a:extLst>
                   <a:ext uri="{0D108BD9-81ED-4DB2-BD59-A6C34878D82A}">
-                    <a16:rowId xmlns:a16="http://schemas.microsoft.com/office/drawing/2014/main" xmlns="" val="3441806414"/>
+                    <a16:rowId xmlns="" xmlns:a16="http://schemas.microsoft.com/office/drawing/2014/main" val="3441806414"/>
                   </a:ext>
                 </a:extLst>
               </a:tr>
@@ -6705,7 +6655,7 @@
                 </a:tc>
                 <a:extLst>
                   <a:ext uri="{0D108BD9-81ED-4DB2-BD59-A6C34878D82A}">
-                    <a16:rowId xmlns:a16="http://schemas.microsoft.com/office/drawing/2014/main" xmlns="" val="492611576"/>
+                    <a16:rowId xmlns="" xmlns:a16="http://schemas.microsoft.com/office/drawing/2014/main" val="492611576"/>
                   </a:ext>
                 </a:extLst>
               </a:tr>
@@ -6893,7 +6843,7 @@
                 </a:tc>
                 <a:extLst>
                   <a:ext uri="{0D108BD9-81ED-4DB2-BD59-A6C34878D82A}">
-                    <a16:rowId xmlns:a16="http://schemas.microsoft.com/office/drawing/2014/main" xmlns="" val="3415118378"/>
+                    <a16:rowId xmlns="" xmlns:a16="http://schemas.microsoft.com/office/drawing/2014/main" val="3415118378"/>
                   </a:ext>
                 </a:extLst>
               </a:tr>
@@ -7059,7 +7009,7 @@
                 </a:tc>
                 <a:extLst>
                   <a:ext uri="{0D108BD9-81ED-4DB2-BD59-A6C34878D82A}">
-                    <a16:rowId xmlns:a16="http://schemas.microsoft.com/office/drawing/2014/main" xmlns="" val="583496555"/>
+                    <a16:rowId xmlns="" xmlns:a16="http://schemas.microsoft.com/office/drawing/2014/main" val="583496555"/>
                   </a:ext>
                 </a:extLst>
               </a:tr>
@@ -7102,7 +7052,7 @@
           <p:cNvPr id="2" name="Title 1">
             <a:extLst>
               <a:ext uri="{FF2B5EF4-FFF2-40B4-BE49-F238E27FC236}">
-                <a16:creationId xmlns:a16="http://schemas.microsoft.com/office/drawing/2014/main" xmlns="" id="{2FAB9958-B62B-4060-8224-1BF9A2F435ED}"/>
+                <a16:creationId xmlns="" xmlns:a16="http://schemas.microsoft.com/office/drawing/2014/main" id="{2FAB9958-B62B-4060-8224-1BF9A2F435ED}"/>
               </a:ext>
             </a:extLst>
           </p:cNvPr>
@@ -7149,7 +7099,7 @@
           <p:cNvPr id="3" name="Content Placeholder 2">
             <a:extLst>
               <a:ext uri="{FF2B5EF4-FFF2-40B4-BE49-F238E27FC236}">
-                <a16:creationId xmlns:a16="http://schemas.microsoft.com/office/drawing/2014/main" xmlns="" id="{AAB8FE39-70FE-4FFF-940E-80858FD6080A}"/>
+                <a16:creationId xmlns="" xmlns:a16="http://schemas.microsoft.com/office/drawing/2014/main" id="{AAB8FE39-70FE-4FFF-940E-80858FD6080A}"/>
               </a:ext>
             </a:extLst>
           </p:cNvPr>
@@ -7270,7 +7220,7 @@
           <p:cNvPr id="2" name="Title 1">
             <a:extLst>
               <a:ext uri="{FF2B5EF4-FFF2-40B4-BE49-F238E27FC236}">
-                <a16:creationId xmlns:a16="http://schemas.microsoft.com/office/drawing/2014/main" xmlns="" id="{1D9E7589-2ABE-45D5-A06C-3B2BD54A6CD6}"/>
+                <a16:creationId xmlns="" xmlns:a16="http://schemas.microsoft.com/office/drawing/2014/main" id="{1D9E7589-2ABE-45D5-A06C-3B2BD54A6CD6}"/>
               </a:ext>
             </a:extLst>
           </p:cNvPr>
@@ -7306,7 +7256,7 @@
           <p:cNvPr id="3" name="Content Placeholder 2">
             <a:extLst>
               <a:ext uri="{FF2B5EF4-FFF2-40B4-BE49-F238E27FC236}">
-                <a16:creationId xmlns:a16="http://schemas.microsoft.com/office/drawing/2014/main" xmlns="" id="{D079487C-CE65-412E-BBCE-401247007AD1}"/>
+                <a16:creationId xmlns="" xmlns:a16="http://schemas.microsoft.com/office/drawing/2014/main" id="{D079487C-CE65-412E-BBCE-401247007AD1}"/>
               </a:ext>
             </a:extLst>
           </p:cNvPr>
@@ -7412,7 +7362,7 @@
           <p:cNvPr id="2" name="Title 1">
             <a:extLst>
               <a:ext uri="{FF2B5EF4-FFF2-40B4-BE49-F238E27FC236}">
-                <a16:creationId xmlns:a16="http://schemas.microsoft.com/office/drawing/2014/main" xmlns="" id="{F5FCAC37-FCD7-4874-A923-C3B1707012B5}"/>
+                <a16:creationId xmlns="" xmlns:a16="http://schemas.microsoft.com/office/drawing/2014/main" id="{F5FCAC37-FCD7-4874-A923-C3B1707012B5}"/>
               </a:ext>
             </a:extLst>
           </p:cNvPr>
@@ -7446,7 +7396,7 @@
           <p:cNvPr id="3" name="Content Placeholder 2">
             <a:extLst>
               <a:ext uri="{FF2B5EF4-FFF2-40B4-BE49-F238E27FC236}">
-                <a16:creationId xmlns:a16="http://schemas.microsoft.com/office/drawing/2014/main" xmlns="" id="{C3959E85-874E-43C0-A2D3-4318AE81EB91}"/>
+                <a16:creationId xmlns="" xmlns:a16="http://schemas.microsoft.com/office/drawing/2014/main" id="{C3959E85-874E-43C0-A2D3-4318AE81EB91}"/>
               </a:ext>
             </a:extLst>
           </p:cNvPr>
@@ -7537,7 +7487,7 @@
           <p:cNvPr id="2" name="Title 1">
             <a:extLst>
               <a:ext uri="{FF2B5EF4-FFF2-40B4-BE49-F238E27FC236}">
-                <a16:creationId xmlns:a16="http://schemas.microsoft.com/office/drawing/2014/main" xmlns="" id="{79E876EA-47CE-4846-8748-666D13086F4E}"/>
+                <a16:creationId xmlns="" xmlns:a16="http://schemas.microsoft.com/office/drawing/2014/main" id="{79E876EA-47CE-4846-8748-666D13086F4E}"/>
               </a:ext>
             </a:extLst>
           </p:cNvPr>
@@ -7591,41 +7541,6 @@
             <a:br>
               <a:rPr lang="en-US" dirty="0"/>
             </a:br>
-            <a:endParaRPr lang="en-US" dirty="0"/>
-          </a:p>
-        </p:txBody>
-      </p:sp>
-      <p:sp>
-        <p:nvSpPr>
-          <p:cNvPr id="3" name="Content Placeholder 2">
-            <a:extLst>
-              <a:ext uri="{FF2B5EF4-FFF2-40B4-BE49-F238E27FC236}">
-                <a16:creationId xmlns:a16="http://schemas.microsoft.com/office/drawing/2014/main" xmlns="" id="{A8F54BD4-45DC-4651-B41C-79284E7CAB39}"/>
-              </a:ext>
-            </a:extLst>
-          </p:cNvPr>
-          <p:cNvSpPr>
-            <a:spLocks noGrp="1"/>
-          </p:cNvSpPr>
-          <p:nvPr>
-            <p:ph idx="1"/>
-          </p:nvPr>
-        </p:nvSpPr>
-        <p:spPr>
-          <a:xfrm>
-            <a:off x="838200" y="1357313"/>
-            <a:ext cx="10515600" cy="5314950"/>
-          </a:xfrm>
-          <a:ln>
-            <a:solidFill>
-              <a:schemeClr val="accent1"/>
-            </a:solidFill>
-          </a:ln>
-        </p:spPr>
-        <p:txBody>
-          <a:bodyPr/>
-          <a:lstStyle/>
-          <a:p>
             <a:endParaRPr lang="en-US" dirty="0"/>
           </a:p>
         </p:txBody>

</xml_diff>

<commit_message>
Replace copyrighted code, add archive
</commit_message>
<xml_diff>
--- a/units/3/lessons/8/resources/petascale-lesson-3.8-slides.pptx
+++ b/units/3/lessons/8/resources/petascale-lesson-3.8-slides.pptx
@@ -127,7 +127,7 @@
       <p15:sldGuideLst xmlns:p15="http://schemas.microsoft.com/office/powerpoint/2012/main"/>
     </p:ext>
     <p:ext uri="http://customooxmlschemas.google.com/">
-      <go:slidesCustomData xmlns="" xmlns:p15="http://schemas.microsoft.com/office/powerpoint/2012/main" xmlns:go="http://customooxmlschemas.google.com/" roundtripDataSignature="AMtx7mhOhAlEUOi/OG3o+t3evIJyqvyxnQ==" r:id="rId23"/>
+      <go:slidesCustomData xmlns:go="http://customooxmlschemas.google.com/" xmlns:p15="http://schemas.microsoft.com/office/powerpoint/2012/main" xmlns="" roundtripDataSignature="AMtx7mhOhAlEUOi/OG3o+t3evIJyqvyxnQ==" r:id="rId23"/>
     </p:ext>
   </p:extLst>
 </p:presentation>
@@ -681,7 +681,7 @@
           <p:cNvPr id="2" name="Title 1">
             <a:extLst>
               <a:ext uri="{FF2B5EF4-FFF2-40B4-BE49-F238E27FC236}">
-                <a16:creationId xmlns="" xmlns:a16="http://schemas.microsoft.com/office/drawing/2014/main" id="{4BF1548A-031C-4017-A469-1F6F57DFA337}"/>
+                <a16:creationId xmlns:a16="http://schemas.microsoft.com/office/drawing/2014/main" xmlns="" id="{4BF1548A-031C-4017-A469-1F6F57DFA337}"/>
               </a:ext>
             </a:extLst>
           </p:cNvPr>
@@ -718,7 +718,7 @@
           <p:cNvPr id="3" name="Subtitle 2">
             <a:extLst>
               <a:ext uri="{FF2B5EF4-FFF2-40B4-BE49-F238E27FC236}">
-                <a16:creationId xmlns="" xmlns:a16="http://schemas.microsoft.com/office/drawing/2014/main" id="{74304642-FB16-43CB-BDB2-BE565D19B085}"/>
+                <a16:creationId xmlns:a16="http://schemas.microsoft.com/office/drawing/2014/main" xmlns="" id="{74304642-FB16-43CB-BDB2-BE565D19B085}"/>
               </a:ext>
             </a:extLst>
           </p:cNvPr>
@@ -788,7 +788,7 @@
           <p:cNvPr id="4" name="Date Placeholder 3">
             <a:extLst>
               <a:ext uri="{FF2B5EF4-FFF2-40B4-BE49-F238E27FC236}">
-                <a16:creationId xmlns="" xmlns:a16="http://schemas.microsoft.com/office/drawing/2014/main" id="{9E17A357-5A12-4FB6-831E-263725DE7068}"/>
+                <a16:creationId xmlns:a16="http://schemas.microsoft.com/office/drawing/2014/main" xmlns="" id="{9E17A357-5A12-4FB6-831E-263725DE7068}"/>
               </a:ext>
             </a:extLst>
           </p:cNvPr>
@@ -817,7 +817,7 @@
           <p:cNvPr id="5" name="Footer Placeholder 4">
             <a:extLst>
               <a:ext uri="{FF2B5EF4-FFF2-40B4-BE49-F238E27FC236}">
-                <a16:creationId xmlns="" xmlns:a16="http://schemas.microsoft.com/office/drawing/2014/main" id="{3B560D76-737D-4F45-B02B-C64E83044C23}"/>
+                <a16:creationId xmlns:a16="http://schemas.microsoft.com/office/drawing/2014/main" xmlns="" id="{3B560D76-737D-4F45-B02B-C64E83044C23}"/>
               </a:ext>
             </a:extLst>
           </p:cNvPr>
@@ -842,7 +842,7 @@
           <p:cNvPr id="6" name="Slide Number Placeholder 5">
             <a:extLst>
               <a:ext uri="{FF2B5EF4-FFF2-40B4-BE49-F238E27FC236}">
-                <a16:creationId xmlns="" xmlns:a16="http://schemas.microsoft.com/office/drawing/2014/main" id="{711C5EBC-DAA7-44A9-87F6-D6E5BF882F57}"/>
+                <a16:creationId xmlns:a16="http://schemas.microsoft.com/office/drawing/2014/main" xmlns="" id="{711C5EBC-DAA7-44A9-87F6-D6E5BF882F57}"/>
               </a:ext>
             </a:extLst>
           </p:cNvPr>
@@ -901,7 +901,7 @@
           <p:cNvPr id="2" name="Title 1">
             <a:extLst>
               <a:ext uri="{FF2B5EF4-FFF2-40B4-BE49-F238E27FC236}">
-                <a16:creationId xmlns="" xmlns:a16="http://schemas.microsoft.com/office/drawing/2014/main" id="{92017ED8-32D3-48A9-865B-D1F7D0D54091}"/>
+                <a16:creationId xmlns:a16="http://schemas.microsoft.com/office/drawing/2014/main" xmlns="" id="{92017ED8-32D3-48A9-865B-D1F7D0D54091}"/>
               </a:ext>
             </a:extLst>
           </p:cNvPr>
@@ -929,7 +929,7 @@
           <p:cNvPr id="3" name="Vertical Text Placeholder 2">
             <a:extLst>
               <a:ext uri="{FF2B5EF4-FFF2-40B4-BE49-F238E27FC236}">
-                <a16:creationId xmlns="" xmlns:a16="http://schemas.microsoft.com/office/drawing/2014/main" id="{42CC3ACB-AF72-4D39-8202-0ABA6ADAAFFC}"/>
+                <a16:creationId xmlns:a16="http://schemas.microsoft.com/office/drawing/2014/main" xmlns="" id="{42CC3ACB-AF72-4D39-8202-0ABA6ADAAFFC}"/>
               </a:ext>
             </a:extLst>
           </p:cNvPr>
@@ -986,7 +986,7 @@
           <p:cNvPr id="4" name="Date Placeholder 3">
             <a:extLst>
               <a:ext uri="{FF2B5EF4-FFF2-40B4-BE49-F238E27FC236}">
-                <a16:creationId xmlns="" xmlns:a16="http://schemas.microsoft.com/office/drawing/2014/main" id="{CBAE86A8-0336-475E-8C53-378986A0913F}"/>
+                <a16:creationId xmlns:a16="http://schemas.microsoft.com/office/drawing/2014/main" xmlns="" id="{CBAE86A8-0336-475E-8C53-378986A0913F}"/>
               </a:ext>
             </a:extLst>
           </p:cNvPr>
@@ -1015,7 +1015,7 @@
           <p:cNvPr id="5" name="Footer Placeholder 4">
             <a:extLst>
               <a:ext uri="{FF2B5EF4-FFF2-40B4-BE49-F238E27FC236}">
-                <a16:creationId xmlns="" xmlns:a16="http://schemas.microsoft.com/office/drawing/2014/main" id="{7DAF4AD7-F88E-4B18-978A-9BD28F63CC1A}"/>
+                <a16:creationId xmlns:a16="http://schemas.microsoft.com/office/drawing/2014/main" xmlns="" id="{7DAF4AD7-F88E-4B18-978A-9BD28F63CC1A}"/>
               </a:ext>
             </a:extLst>
           </p:cNvPr>
@@ -1040,7 +1040,7 @@
           <p:cNvPr id="6" name="Slide Number Placeholder 5">
             <a:extLst>
               <a:ext uri="{FF2B5EF4-FFF2-40B4-BE49-F238E27FC236}">
-                <a16:creationId xmlns="" xmlns:a16="http://schemas.microsoft.com/office/drawing/2014/main" id="{0ACE9313-B78B-4B28-9BBD-0BA91A2593EA}"/>
+                <a16:creationId xmlns:a16="http://schemas.microsoft.com/office/drawing/2014/main" xmlns="" id="{0ACE9313-B78B-4B28-9BBD-0BA91A2593EA}"/>
               </a:ext>
             </a:extLst>
           </p:cNvPr>
@@ -1099,7 +1099,7 @@
           <p:cNvPr id="2" name="Vertical Title 1">
             <a:extLst>
               <a:ext uri="{FF2B5EF4-FFF2-40B4-BE49-F238E27FC236}">
-                <a16:creationId xmlns="" xmlns:a16="http://schemas.microsoft.com/office/drawing/2014/main" id="{ACDED3BC-5406-4FD7-8220-DA00CDF3FFE2}"/>
+                <a16:creationId xmlns:a16="http://schemas.microsoft.com/office/drawing/2014/main" xmlns="" id="{ACDED3BC-5406-4FD7-8220-DA00CDF3FFE2}"/>
               </a:ext>
             </a:extLst>
           </p:cNvPr>
@@ -1132,7 +1132,7 @@
           <p:cNvPr id="3" name="Vertical Text Placeholder 2">
             <a:extLst>
               <a:ext uri="{FF2B5EF4-FFF2-40B4-BE49-F238E27FC236}">
-                <a16:creationId xmlns="" xmlns:a16="http://schemas.microsoft.com/office/drawing/2014/main" id="{DC33A346-AFBF-4885-ABCB-E5FE8DA8A816}"/>
+                <a16:creationId xmlns:a16="http://schemas.microsoft.com/office/drawing/2014/main" xmlns="" id="{DC33A346-AFBF-4885-ABCB-E5FE8DA8A816}"/>
               </a:ext>
             </a:extLst>
           </p:cNvPr>
@@ -1194,7 +1194,7 @@
           <p:cNvPr id="4" name="Date Placeholder 3">
             <a:extLst>
               <a:ext uri="{FF2B5EF4-FFF2-40B4-BE49-F238E27FC236}">
-                <a16:creationId xmlns="" xmlns:a16="http://schemas.microsoft.com/office/drawing/2014/main" id="{D1C59FBE-5C0E-46E3-8F73-D3B85FFB7049}"/>
+                <a16:creationId xmlns:a16="http://schemas.microsoft.com/office/drawing/2014/main" xmlns="" id="{D1C59FBE-5C0E-46E3-8F73-D3B85FFB7049}"/>
               </a:ext>
             </a:extLst>
           </p:cNvPr>
@@ -1223,7 +1223,7 @@
           <p:cNvPr id="5" name="Footer Placeholder 4">
             <a:extLst>
               <a:ext uri="{FF2B5EF4-FFF2-40B4-BE49-F238E27FC236}">
-                <a16:creationId xmlns="" xmlns:a16="http://schemas.microsoft.com/office/drawing/2014/main" id="{AD2B8963-6DEF-4C8E-9E8B-3657C93F1301}"/>
+                <a16:creationId xmlns:a16="http://schemas.microsoft.com/office/drawing/2014/main" xmlns="" id="{AD2B8963-6DEF-4C8E-9E8B-3657C93F1301}"/>
               </a:ext>
             </a:extLst>
           </p:cNvPr>
@@ -1248,7 +1248,7 @@
           <p:cNvPr id="6" name="Slide Number Placeholder 5">
             <a:extLst>
               <a:ext uri="{FF2B5EF4-FFF2-40B4-BE49-F238E27FC236}">
-                <a16:creationId xmlns="" xmlns:a16="http://schemas.microsoft.com/office/drawing/2014/main" id="{388038DF-83CC-45F7-90AD-68EA5D4E83A4}"/>
+                <a16:creationId xmlns:a16="http://schemas.microsoft.com/office/drawing/2014/main" xmlns="" id="{388038DF-83CC-45F7-90AD-68EA5D4E83A4}"/>
               </a:ext>
             </a:extLst>
           </p:cNvPr>
@@ -1307,7 +1307,7 @@
           <p:cNvPr id="2" name="Title 1">
             <a:extLst>
               <a:ext uri="{FF2B5EF4-FFF2-40B4-BE49-F238E27FC236}">
-                <a16:creationId xmlns="" xmlns:a16="http://schemas.microsoft.com/office/drawing/2014/main" id="{77C8F21E-0BA7-4D7B-8E95-5004BB0FB263}"/>
+                <a16:creationId xmlns:a16="http://schemas.microsoft.com/office/drawing/2014/main" xmlns="" id="{77C8F21E-0BA7-4D7B-8E95-5004BB0FB263}"/>
               </a:ext>
             </a:extLst>
           </p:cNvPr>
@@ -1335,7 +1335,7 @@
           <p:cNvPr id="3" name="Content Placeholder 2">
             <a:extLst>
               <a:ext uri="{FF2B5EF4-FFF2-40B4-BE49-F238E27FC236}">
-                <a16:creationId xmlns="" xmlns:a16="http://schemas.microsoft.com/office/drawing/2014/main" id="{A2579068-4E3F-47D8-9543-2CE3A5353012}"/>
+                <a16:creationId xmlns:a16="http://schemas.microsoft.com/office/drawing/2014/main" xmlns="" id="{A2579068-4E3F-47D8-9543-2CE3A5353012}"/>
               </a:ext>
             </a:extLst>
           </p:cNvPr>
@@ -1392,7 +1392,7 @@
           <p:cNvPr id="4" name="Date Placeholder 3">
             <a:extLst>
               <a:ext uri="{FF2B5EF4-FFF2-40B4-BE49-F238E27FC236}">
-                <a16:creationId xmlns="" xmlns:a16="http://schemas.microsoft.com/office/drawing/2014/main" id="{E2D1C011-12E6-44E4-A195-99E6DE27D293}"/>
+                <a16:creationId xmlns:a16="http://schemas.microsoft.com/office/drawing/2014/main" xmlns="" id="{E2D1C011-12E6-44E4-A195-99E6DE27D293}"/>
               </a:ext>
             </a:extLst>
           </p:cNvPr>
@@ -1421,7 +1421,7 @@
           <p:cNvPr id="5" name="Footer Placeholder 4">
             <a:extLst>
               <a:ext uri="{FF2B5EF4-FFF2-40B4-BE49-F238E27FC236}">
-                <a16:creationId xmlns="" xmlns:a16="http://schemas.microsoft.com/office/drawing/2014/main" id="{89FA2B6E-3830-4EA4-928D-4D5F317D0F8B}"/>
+                <a16:creationId xmlns:a16="http://schemas.microsoft.com/office/drawing/2014/main" xmlns="" id="{89FA2B6E-3830-4EA4-928D-4D5F317D0F8B}"/>
               </a:ext>
             </a:extLst>
           </p:cNvPr>
@@ -1446,7 +1446,7 @@
           <p:cNvPr id="6" name="Slide Number Placeholder 5">
             <a:extLst>
               <a:ext uri="{FF2B5EF4-FFF2-40B4-BE49-F238E27FC236}">
-                <a16:creationId xmlns="" xmlns:a16="http://schemas.microsoft.com/office/drawing/2014/main" id="{68C8C216-3724-451A-BE89-E30F691F09CB}"/>
+                <a16:creationId xmlns:a16="http://schemas.microsoft.com/office/drawing/2014/main" xmlns="" id="{68C8C216-3724-451A-BE89-E30F691F09CB}"/>
               </a:ext>
             </a:extLst>
           </p:cNvPr>
@@ -1505,7 +1505,7 @@
           <p:cNvPr id="2" name="Title 1">
             <a:extLst>
               <a:ext uri="{FF2B5EF4-FFF2-40B4-BE49-F238E27FC236}">
-                <a16:creationId xmlns="" xmlns:a16="http://schemas.microsoft.com/office/drawing/2014/main" id="{231B92F1-AE35-479A-A1DB-99B1583CDD81}"/>
+                <a16:creationId xmlns:a16="http://schemas.microsoft.com/office/drawing/2014/main" xmlns="" id="{231B92F1-AE35-479A-A1DB-99B1583CDD81}"/>
               </a:ext>
             </a:extLst>
           </p:cNvPr>
@@ -1542,7 +1542,7 @@
           <p:cNvPr id="3" name="Text Placeholder 2">
             <a:extLst>
               <a:ext uri="{FF2B5EF4-FFF2-40B4-BE49-F238E27FC236}">
-                <a16:creationId xmlns="" xmlns:a16="http://schemas.microsoft.com/office/drawing/2014/main" id="{510A97F5-CF09-4A2D-BF21-2B70E8AD551C}"/>
+                <a16:creationId xmlns:a16="http://schemas.microsoft.com/office/drawing/2014/main" xmlns="" id="{510A97F5-CF09-4A2D-BF21-2B70E8AD551C}"/>
               </a:ext>
             </a:extLst>
           </p:cNvPr>
@@ -1667,7 +1667,7 @@
           <p:cNvPr id="4" name="Date Placeholder 3">
             <a:extLst>
               <a:ext uri="{FF2B5EF4-FFF2-40B4-BE49-F238E27FC236}">
-                <a16:creationId xmlns="" xmlns:a16="http://schemas.microsoft.com/office/drawing/2014/main" id="{0301327A-1010-450D-8DDD-14CC7ECF3AAB}"/>
+                <a16:creationId xmlns:a16="http://schemas.microsoft.com/office/drawing/2014/main" xmlns="" id="{0301327A-1010-450D-8DDD-14CC7ECF3AAB}"/>
               </a:ext>
             </a:extLst>
           </p:cNvPr>
@@ -1696,7 +1696,7 @@
           <p:cNvPr id="5" name="Footer Placeholder 4">
             <a:extLst>
               <a:ext uri="{FF2B5EF4-FFF2-40B4-BE49-F238E27FC236}">
-                <a16:creationId xmlns="" xmlns:a16="http://schemas.microsoft.com/office/drawing/2014/main" id="{9A389986-F889-43BB-BCFC-AF6054064011}"/>
+                <a16:creationId xmlns:a16="http://schemas.microsoft.com/office/drawing/2014/main" xmlns="" id="{9A389986-F889-43BB-BCFC-AF6054064011}"/>
               </a:ext>
             </a:extLst>
           </p:cNvPr>
@@ -1721,7 +1721,7 @@
           <p:cNvPr id="6" name="Slide Number Placeholder 5">
             <a:extLst>
               <a:ext uri="{FF2B5EF4-FFF2-40B4-BE49-F238E27FC236}">
-                <a16:creationId xmlns="" xmlns:a16="http://schemas.microsoft.com/office/drawing/2014/main" id="{2646CBB6-A5A9-4B55-85FE-AC05DF608DE8}"/>
+                <a16:creationId xmlns:a16="http://schemas.microsoft.com/office/drawing/2014/main" xmlns="" id="{2646CBB6-A5A9-4B55-85FE-AC05DF608DE8}"/>
               </a:ext>
             </a:extLst>
           </p:cNvPr>
@@ -1780,7 +1780,7 @@
           <p:cNvPr id="2" name="Title 1">
             <a:extLst>
               <a:ext uri="{FF2B5EF4-FFF2-40B4-BE49-F238E27FC236}">
-                <a16:creationId xmlns="" xmlns:a16="http://schemas.microsoft.com/office/drawing/2014/main" id="{D2B07227-E424-4031-BBB3-2AD61C3D0DE3}"/>
+                <a16:creationId xmlns:a16="http://schemas.microsoft.com/office/drawing/2014/main" xmlns="" id="{D2B07227-E424-4031-BBB3-2AD61C3D0DE3}"/>
               </a:ext>
             </a:extLst>
           </p:cNvPr>
@@ -1808,7 +1808,7 @@
           <p:cNvPr id="3" name="Content Placeholder 2">
             <a:extLst>
               <a:ext uri="{FF2B5EF4-FFF2-40B4-BE49-F238E27FC236}">
-                <a16:creationId xmlns="" xmlns:a16="http://schemas.microsoft.com/office/drawing/2014/main" id="{4BBE14F5-39A7-48DA-9FA0-D66708895C74}"/>
+                <a16:creationId xmlns:a16="http://schemas.microsoft.com/office/drawing/2014/main" xmlns="" id="{4BBE14F5-39A7-48DA-9FA0-D66708895C74}"/>
               </a:ext>
             </a:extLst>
           </p:cNvPr>
@@ -1870,7 +1870,7 @@
           <p:cNvPr id="4" name="Content Placeholder 3">
             <a:extLst>
               <a:ext uri="{FF2B5EF4-FFF2-40B4-BE49-F238E27FC236}">
-                <a16:creationId xmlns="" xmlns:a16="http://schemas.microsoft.com/office/drawing/2014/main" id="{CAD71E3C-60A0-4402-8888-62897F4CE693}"/>
+                <a16:creationId xmlns:a16="http://schemas.microsoft.com/office/drawing/2014/main" xmlns="" id="{CAD71E3C-60A0-4402-8888-62897F4CE693}"/>
               </a:ext>
             </a:extLst>
           </p:cNvPr>
@@ -1932,7 +1932,7 @@
           <p:cNvPr id="5" name="Date Placeholder 4">
             <a:extLst>
               <a:ext uri="{FF2B5EF4-FFF2-40B4-BE49-F238E27FC236}">
-                <a16:creationId xmlns="" xmlns:a16="http://schemas.microsoft.com/office/drawing/2014/main" id="{219C5DB4-2DC8-4210-B2F1-9F366713038C}"/>
+                <a16:creationId xmlns:a16="http://schemas.microsoft.com/office/drawing/2014/main" xmlns="" id="{219C5DB4-2DC8-4210-B2F1-9F366713038C}"/>
               </a:ext>
             </a:extLst>
           </p:cNvPr>
@@ -1961,7 +1961,7 @@
           <p:cNvPr id="6" name="Footer Placeholder 5">
             <a:extLst>
               <a:ext uri="{FF2B5EF4-FFF2-40B4-BE49-F238E27FC236}">
-                <a16:creationId xmlns="" xmlns:a16="http://schemas.microsoft.com/office/drawing/2014/main" id="{D4F7ABFA-7B68-4E83-8E08-7F5B44E13869}"/>
+                <a16:creationId xmlns:a16="http://schemas.microsoft.com/office/drawing/2014/main" xmlns="" id="{D4F7ABFA-7B68-4E83-8E08-7F5B44E13869}"/>
               </a:ext>
             </a:extLst>
           </p:cNvPr>
@@ -1986,7 +1986,7 @@
           <p:cNvPr id="7" name="Slide Number Placeholder 6">
             <a:extLst>
               <a:ext uri="{FF2B5EF4-FFF2-40B4-BE49-F238E27FC236}">
-                <a16:creationId xmlns="" xmlns:a16="http://schemas.microsoft.com/office/drawing/2014/main" id="{FE71CF60-10D0-4244-A96C-6C488AF3915D}"/>
+                <a16:creationId xmlns:a16="http://schemas.microsoft.com/office/drawing/2014/main" xmlns="" id="{FE71CF60-10D0-4244-A96C-6C488AF3915D}"/>
               </a:ext>
             </a:extLst>
           </p:cNvPr>
@@ -2045,7 +2045,7 @@
           <p:cNvPr id="2" name="Title 1">
             <a:extLst>
               <a:ext uri="{FF2B5EF4-FFF2-40B4-BE49-F238E27FC236}">
-                <a16:creationId xmlns="" xmlns:a16="http://schemas.microsoft.com/office/drawing/2014/main" id="{73073737-E7AA-4A77-AF7F-BCB0E39084AD}"/>
+                <a16:creationId xmlns:a16="http://schemas.microsoft.com/office/drawing/2014/main" xmlns="" id="{73073737-E7AA-4A77-AF7F-BCB0E39084AD}"/>
               </a:ext>
             </a:extLst>
           </p:cNvPr>
@@ -2078,7 +2078,7 @@
           <p:cNvPr id="3" name="Text Placeholder 2">
             <a:extLst>
               <a:ext uri="{FF2B5EF4-FFF2-40B4-BE49-F238E27FC236}">
-                <a16:creationId xmlns="" xmlns:a16="http://schemas.microsoft.com/office/drawing/2014/main" id="{CA96E096-0255-4086-9035-A63535906FF5}"/>
+                <a16:creationId xmlns:a16="http://schemas.microsoft.com/office/drawing/2014/main" xmlns="" id="{CA96E096-0255-4086-9035-A63535906FF5}"/>
               </a:ext>
             </a:extLst>
           </p:cNvPr>
@@ -2149,7 +2149,7 @@
           <p:cNvPr id="4" name="Content Placeholder 3">
             <a:extLst>
               <a:ext uri="{FF2B5EF4-FFF2-40B4-BE49-F238E27FC236}">
-                <a16:creationId xmlns="" xmlns:a16="http://schemas.microsoft.com/office/drawing/2014/main" id="{3437967A-F630-4562-994C-1C8CDD8258BC}"/>
+                <a16:creationId xmlns:a16="http://schemas.microsoft.com/office/drawing/2014/main" xmlns="" id="{3437967A-F630-4562-994C-1C8CDD8258BC}"/>
               </a:ext>
             </a:extLst>
           </p:cNvPr>
@@ -2211,7 +2211,7 @@
           <p:cNvPr id="5" name="Text Placeholder 4">
             <a:extLst>
               <a:ext uri="{FF2B5EF4-FFF2-40B4-BE49-F238E27FC236}">
-                <a16:creationId xmlns="" xmlns:a16="http://schemas.microsoft.com/office/drawing/2014/main" id="{C187920C-D647-4D12-8724-F4AC8CAFD5DB}"/>
+                <a16:creationId xmlns:a16="http://schemas.microsoft.com/office/drawing/2014/main" xmlns="" id="{C187920C-D647-4D12-8724-F4AC8CAFD5DB}"/>
               </a:ext>
             </a:extLst>
           </p:cNvPr>
@@ -2282,7 +2282,7 @@
           <p:cNvPr id="6" name="Content Placeholder 5">
             <a:extLst>
               <a:ext uri="{FF2B5EF4-FFF2-40B4-BE49-F238E27FC236}">
-                <a16:creationId xmlns="" xmlns:a16="http://schemas.microsoft.com/office/drawing/2014/main" id="{20E33A59-014F-4CCE-81F9-97B02615123A}"/>
+                <a16:creationId xmlns:a16="http://schemas.microsoft.com/office/drawing/2014/main" xmlns="" id="{20E33A59-014F-4CCE-81F9-97B02615123A}"/>
               </a:ext>
             </a:extLst>
           </p:cNvPr>
@@ -2344,7 +2344,7 @@
           <p:cNvPr id="7" name="Date Placeholder 6">
             <a:extLst>
               <a:ext uri="{FF2B5EF4-FFF2-40B4-BE49-F238E27FC236}">
-                <a16:creationId xmlns="" xmlns:a16="http://schemas.microsoft.com/office/drawing/2014/main" id="{4BA08CB2-C117-447E-A916-0D66CF4D8AD2}"/>
+                <a16:creationId xmlns:a16="http://schemas.microsoft.com/office/drawing/2014/main" xmlns="" id="{4BA08CB2-C117-447E-A916-0D66CF4D8AD2}"/>
               </a:ext>
             </a:extLst>
           </p:cNvPr>
@@ -2373,7 +2373,7 @@
           <p:cNvPr id="8" name="Footer Placeholder 7">
             <a:extLst>
               <a:ext uri="{FF2B5EF4-FFF2-40B4-BE49-F238E27FC236}">
-                <a16:creationId xmlns="" xmlns:a16="http://schemas.microsoft.com/office/drawing/2014/main" id="{D29D0CA4-543C-4E0A-A731-7C56C357D378}"/>
+                <a16:creationId xmlns:a16="http://schemas.microsoft.com/office/drawing/2014/main" xmlns="" id="{D29D0CA4-543C-4E0A-A731-7C56C357D378}"/>
               </a:ext>
             </a:extLst>
           </p:cNvPr>
@@ -2398,7 +2398,7 @@
           <p:cNvPr id="9" name="Slide Number Placeholder 8">
             <a:extLst>
               <a:ext uri="{FF2B5EF4-FFF2-40B4-BE49-F238E27FC236}">
-                <a16:creationId xmlns="" xmlns:a16="http://schemas.microsoft.com/office/drawing/2014/main" id="{C7257B18-ED85-4692-AE50-1FA346CCC97C}"/>
+                <a16:creationId xmlns:a16="http://schemas.microsoft.com/office/drawing/2014/main" xmlns="" id="{C7257B18-ED85-4692-AE50-1FA346CCC97C}"/>
               </a:ext>
             </a:extLst>
           </p:cNvPr>
@@ -2457,7 +2457,7 @@
           <p:cNvPr id="2" name="Title 1">
             <a:extLst>
               <a:ext uri="{FF2B5EF4-FFF2-40B4-BE49-F238E27FC236}">
-                <a16:creationId xmlns="" xmlns:a16="http://schemas.microsoft.com/office/drawing/2014/main" id="{97579879-9EC8-4EA4-A995-D07D768E4F84}"/>
+                <a16:creationId xmlns:a16="http://schemas.microsoft.com/office/drawing/2014/main" xmlns="" id="{97579879-9EC8-4EA4-A995-D07D768E4F84}"/>
               </a:ext>
             </a:extLst>
           </p:cNvPr>
@@ -2485,7 +2485,7 @@
           <p:cNvPr id="3" name="Date Placeholder 2">
             <a:extLst>
               <a:ext uri="{FF2B5EF4-FFF2-40B4-BE49-F238E27FC236}">
-                <a16:creationId xmlns="" xmlns:a16="http://schemas.microsoft.com/office/drawing/2014/main" id="{56292A33-2D1F-4823-B252-99E97C0D8D03}"/>
+                <a16:creationId xmlns:a16="http://schemas.microsoft.com/office/drawing/2014/main" xmlns="" id="{56292A33-2D1F-4823-B252-99E97C0D8D03}"/>
               </a:ext>
             </a:extLst>
           </p:cNvPr>
@@ -2514,7 +2514,7 @@
           <p:cNvPr id="4" name="Footer Placeholder 3">
             <a:extLst>
               <a:ext uri="{FF2B5EF4-FFF2-40B4-BE49-F238E27FC236}">
-                <a16:creationId xmlns="" xmlns:a16="http://schemas.microsoft.com/office/drawing/2014/main" id="{24C7B68E-6BE9-4ED5-B7D3-D74B3AC38C24}"/>
+                <a16:creationId xmlns:a16="http://schemas.microsoft.com/office/drawing/2014/main" xmlns="" id="{24C7B68E-6BE9-4ED5-B7D3-D74B3AC38C24}"/>
               </a:ext>
             </a:extLst>
           </p:cNvPr>
@@ -2539,7 +2539,7 @@
           <p:cNvPr id="5" name="Slide Number Placeholder 4">
             <a:extLst>
               <a:ext uri="{FF2B5EF4-FFF2-40B4-BE49-F238E27FC236}">
-                <a16:creationId xmlns="" xmlns:a16="http://schemas.microsoft.com/office/drawing/2014/main" id="{260CC1B9-4FFC-478E-B58E-91CC1AF27BED}"/>
+                <a16:creationId xmlns:a16="http://schemas.microsoft.com/office/drawing/2014/main" xmlns="" id="{260CC1B9-4FFC-478E-B58E-91CC1AF27BED}"/>
               </a:ext>
             </a:extLst>
           </p:cNvPr>
@@ -2598,7 +2598,7 @@
           <p:cNvPr id="2" name="Date Placeholder 1">
             <a:extLst>
               <a:ext uri="{FF2B5EF4-FFF2-40B4-BE49-F238E27FC236}">
-                <a16:creationId xmlns="" xmlns:a16="http://schemas.microsoft.com/office/drawing/2014/main" id="{36A884B7-E95E-4524-9970-595815250247}"/>
+                <a16:creationId xmlns:a16="http://schemas.microsoft.com/office/drawing/2014/main" xmlns="" id="{36A884B7-E95E-4524-9970-595815250247}"/>
               </a:ext>
             </a:extLst>
           </p:cNvPr>
@@ -2627,7 +2627,7 @@
           <p:cNvPr id="3" name="Footer Placeholder 2">
             <a:extLst>
               <a:ext uri="{FF2B5EF4-FFF2-40B4-BE49-F238E27FC236}">
-                <a16:creationId xmlns="" xmlns:a16="http://schemas.microsoft.com/office/drawing/2014/main" id="{85AF3E20-0700-4A4C-9B49-598F14486D7F}"/>
+                <a16:creationId xmlns:a16="http://schemas.microsoft.com/office/drawing/2014/main" xmlns="" id="{85AF3E20-0700-4A4C-9B49-598F14486D7F}"/>
               </a:ext>
             </a:extLst>
           </p:cNvPr>
@@ -2652,7 +2652,7 @@
           <p:cNvPr id="4" name="Slide Number Placeholder 3">
             <a:extLst>
               <a:ext uri="{FF2B5EF4-FFF2-40B4-BE49-F238E27FC236}">
-                <a16:creationId xmlns="" xmlns:a16="http://schemas.microsoft.com/office/drawing/2014/main" id="{2FBE44B5-BA8F-4623-BD93-F657EB2CE23E}"/>
+                <a16:creationId xmlns:a16="http://schemas.microsoft.com/office/drawing/2014/main" xmlns="" id="{2FBE44B5-BA8F-4623-BD93-F657EB2CE23E}"/>
               </a:ext>
             </a:extLst>
           </p:cNvPr>
@@ -2711,7 +2711,7 @@
           <p:cNvPr id="2" name="Title 1">
             <a:extLst>
               <a:ext uri="{FF2B5EF4-FFF2-40B4-BE49-F238E27FC236}">
-                <a16:creationId xmlns="" xmlns:a16="http://schemas.microsoft.com/office/drawing/2014/main" id="{C9DB0524-F63C-4D3B-A166-48089E0CC249}"/>
+                <a16:creationId xmlns:a16="http://schemas.microsoft.com/office/drawing/2014/main" xmlns="" id="{C9DB0524-F63C-4D3B-A166-48089E0CC249}"/>
               </a:ext>
             </a:extLst>
           </p:cNvPr>
@@ -2748,7 +2748,7 @@
           <p:cNvPr id="3" name="Content Placeholder 2">
             <a:extLst>
               <a:ext uri="{FF2B5EF4-FFF2-40B4-BE49-F238E27FC236}">
-                <a16:creationId xmlns="" xmlns:a16="http://schemas.microsoft.com/office/drawing/2014/main" id="{ED01F34B-9227-44D9-8AAC-9F4D9BCC45B9}"/>
+                <a16:creationId xmlns:a16="http://schemas.microsoft.com/office/drawing/2014/main" xmlns="" id="{ED01F34B-9227-44D9-8AAC-9F4D9BCC45B9}"/>
               </a:ext>
             </a:extLst>
           </p:cNvPr>
@@ -2838,7 +2838,7 @@
           <p:cNvPr id="4" name="Text Placeholder 3">
             <a:extLst>
               <a:ext uri="{FF2B5EF4-FFF2-40B4-BE49-F238E27FC236}">
-                <a16:creationId xmlns="" xmlns:a16="http://schemas.microsoft.com/office/drawing/2014/main" id="{FC4B3FC6-BDE7-458E-A0D4-3B5CDEE2A2CF}"/>
+                <a16:creationId xmlns:a16="http://schemas.microsoft.com/office/drawing/2014/main" xmlns="" id="{FC4B3FC6-BDE7-458E-A0D4-3B5CDEE2A2CF}"/>
               </a:ext>
             </a:extLst>
           </p:cNvPr>
@@ -2909,7 +2909,7 @@
           <p:cNvPr id="5" name="Date Placeholder 4">
             <a:extLst>
               <a:ext uri="{FF2B5EF4-FFF2-40B4-BE49-F238E27FC236}">
-                <a16:creationId xmlns="" xmlns:a16="http://schemas.microsoft.com/office/drawing/2014/main" id="{D668A527-DB80-4A46-B718-1AA0F646E7FC}"/>
+                <a16:creationId xmlns:a16="http://schemas.microsoft.com/office/drawing/2014/main" xmlns="" id="{D668A527-DB80-4A46-B718-1AA0F646E7FC}"/>
               </a:ext>
             </a:extLst>
           </p:cNvPr>
@@ -2938,7 +2938,7 @@
           <p:cNvPr id="6" name="Footer Placeholder 5">
             <a:extLst>
               <a:ext uri="{FF2B5EF4-FFF2-40B4-BE49-F238E27FC236}">
-                <a16:creationId xmlns="" xmlns:a16="http://schemas.microsoft.com/office/drawing/2014/main" id="{C3912AFE-009E-4B98-A758-6A9889031F4D}"/>
+                <a16:creationId xmlns:a16="http://schemas.microsoft.com/office/drawing/2014/main" xmlns="" id="{C3912AFE-009E-4B98-A758-6A9889031F4D}"/>
               </a:ext>
             </a:extLst>
           </p:cNvPr>
@@ -2963,7 +2963,7 @@
           <p:cNvPr id="7" name="Slide Number Placeholder 6">
             <a:extLst>
               <a:ext uri="{FF2B5EF4-FFF2-40B4-BE49-F238E27FC236}">
-                <a16:creationId xmlns="" xmlns:a16="http://schemas.microsoft.com/office/drawing/2014/main" id="{E725B9B9-1722-4441-BC9D-A99F4787E50A}"/>
+                <a16:creationId xmlns:a16="http://schemas.microsoft.com/office/drawing/2014/main" xmlns="" id="{E725B9B9-1722-4441-BC9D-A99F4787E50A}"/>
               </a:ext>
             </a:extLst>
           </p:cNvPr>
@@ -3022,7 +3022,7 @@
           <p:cNvPr id="2" name="Title 1">
             <a:extLst>
               <a:ext uri="{FF2B5EF4-FFF2-40B4-BE49-F238E27FC236}">
-                <a16:creationId xmlns="" xmlns:a16="http://schemas.microsoft.com/office/drawing/2014/main" id="{57ED2D60-7517-4620-8434-71A1B86C2B3A}"/>
+                <a16:creationId xmlns:a16="http://schemas.microsoft.com/office/drawing/2014/main" xmlns="" id="{57ED2D60-7517-4620-8434-71A1B86C2B3A}"/>
               </a:ext>
             </a:extLst>
           </p:cNvPr>
@@ -3059,7 +3059,7 @@
           <p:cNvPr id="3" name="Picture Placeholder 2">
             <a:extLst>
               <a:ext uri="{FF2B5EF4-FFF2-40B4-BE49-F238E27FC236}">
-                <a16:creationId xmlns="" xmlns:a16="http://schemas.microsoft.com/office/drawing/2014/main" id="{6F950A2E-0AC2-40B7-B734-6E908DE2D931}"/>
+                <a16:creationId xmlns:a16="http://schemas.microsoft.com/office/drawing/2014/main" xmlns="" id="{6F950A2E-0AC2-40B7-B734-6E908DE2D931}"/>
               </a:ext>
             </a:extLst>
           </p:cNvPr>
@@ -3126,7 +3126,7 @@
           <p:cNvPr id="4" name="Text Placeholder 3">
             <a:extLst>
               <a:ext uri="{FF2B5EF4-FFF2-40B4-BE49-F238E27FC236}">
-                <a16:creationId xmlns="" xmlns:a16="http://schemas.microsoft.com/office/drawing/2014/main" id="{9D7D254B-29A8-4412-A23A-AB503F4020FD}"/>
+                <a16:creationId xmlns:a16="http://schemas.microsoft.com/office/drawing/2014/main" xmlns="" id="{9D7D254B-29A8-4412-A23A-AB503F4020FD}"/>
               </a:ext>
             </a:extLst>
           </p:cNvPr>
@@ -3197,7 +3197,7 @@
           <p:cNvPr id="5" name="Date Placeholder 4">
             <a:extLst>
               <a:ext uri="{FF2B5EF4-FFF2-40B4-BE49-F238E27FC236}">
-                <a16:creationId xmlns="" xmlns:a16="http://schemas.microsoft.com/office/drawing/2014/main" id="{D910A96D-2768-4D80-9060-4598900E3F22}"/>
+                <a16:creationId xmlns:a16="http://schemas.microsoft.com/office/drawing/2014/main" xmlns="" id="{D910A96D-2768-4D80-9060-4598900E3F22}"/>
               </a:ext>
             </a:extLst>
           </p:cNvPr>
@@ -3226,7 +3226,7 @@
           <p:cNvPr id="6" name="Footer Placeholder 5">
             <a:extLst>
               <a:ext uri="{FF2B5EF4-FFF2-40B4-BE49-F238E27FC236}">
-                <a16:creationId xmlns="" xmlns:a16="http://schemas.microsoft.com/office/drawing/2014/main" id="{40442613-6820-4E02-8767-4A56738C19E4}"/>
+                <a16:creationId xmlns:a16="http://schemas.microsoft.com/office/drawing/2014/main" xmlns="" id="{40442613-6820-4E02-8767-4A56738C19E4}"/>
               </a:ext>
             </a:extLst>
           </p:cNvPr>
@@ -3251,7 +3251,7 @@
           <p:cNvPr id="7" name="Slide Number Placeholder 6">
             <a:extLst>
               <a:ext uri="{FF2B5EF4-FFF2-40B4-BE49-F238E27FC236}">
-                <a16:creationId xmlns="" xmlns:a16="http://schemas.microsoft.com/office/drawing/2014/main" id="{CB18FC9A-02F5-433E-8828-4CEAA332B5FA}"/>
+                <a16:creationId xmlns:a16="http://schemas.microsoft.com/office/drawing/2014/main" xmlns="" id="{CB18FC9A-02F5-433E-8828-4CEAA332B5FA}"/>
               </a:ext>
             </a:extLst>
           </p:cNvPr>
@@ -3315,7 +3315,7 @@
           <p:cNvPr id="2" name="Title Placeholder 1">
             <a:extLst>
               <a:ext uri="{FF2B5EF4-FFF2-40B4-BE49-F238E27FC236}">
-                <a16:creationId xmlns="" xmlns:a16="http://schemas.microsoft.com/office/drawing/2014/main" id="{CD4FA33A-BDCE-4DA7-A39F-6ADCDBC997EC}"/>
+                <a16:creationId xmlns:a16="http://schemas.microsoft.com/office/drawing/2014/main" xmlns="" id="{CD4FA33A-BDCE-4DA7-A39F-6ADCDBC997EC}"/>
               </a:ext>
             </a:extLst>
           </p:cNvPr>
@@ -3353,7 +3353,7 @@
           <p:cNvPr id="3" name="Text Placeholder 2">
             <a:extLst>
               <a:ext uri="{FF2B5EF4-FFF2-40B4-BE49-F238E27FC236}">
-                <a16:creationId xmlns="" xmlns:a16="http://schemas.microsoft.com/office/drawing/2014/main" id="{86CC21BF-88DD-4AD5-BAA9-8D109B473101}"/>
+                <a16:creationId xmlns:a16="http://schemas.microsoft.com/office/drawing/2014/main" xmlns="" id="{86CC21BF-88DD-4AD5-BAA9-8D109B473101}"/>
               </a:ext>
             </a:extLst>
           </p:cNvPr>
@@ -3420,7 +3420,7 @@
           <p:cNvPr id="4" name="Date Placeholder 3">
             <a:extLst>
               <a:ext uri="{FF2B5EF4-FFF2-40B4-BE49-F238E27FC236}">
-                <a16:creationId xmlns="" xmlns:a16="http://schemas.microsoft.com/office/drawing/2014/main" id="{9AAC3D1B-D615-4DE2-AC94-EDCE63FF4600}"/>
+                <a16:creationId xmlns:a16="http://schemas.microsoft.com/office/drawing/2014/main" xmlns="" id="{9AAC3D1B-D615-4DE2-AC94-EDCE63FF4600}"/>
               </a:ext>
             </a:extLst>
           </p:cNvPr>
@@ -3467,7 +3467,7 @@
           <p:cNvPr id="5" name="Footer Placeholder 4">
             <a:extLst>
               <a:ext uri="{FF2B5EF4-FFF2-40B4-BE49-F238E27FC236}">
-                <a16:creationId xmlns="" xmlns:a16="http://schemas.microsoft.com/office/drawing/2014/main" id="{A2FD67E6-1A57-4987-A830-E077F3332059}"/>
+                <a16:creationId xmlns:a16="http://schemas.microsoft.com/office/drawing/2014/main" xmlns="" id="{A2FD67E6-1A57-4987-A830-E077F3332059}"/>
               </a:ext>
             </a:extLst>
           </p:cNvPr>
@@ -3510,7 +3510,7 @@
           <p:cNvPr id="6" name="Slide Number Placeholder 5">
             <a:extLst>
               <a:ext uri="{FF2B5EF4-FFF2-40B4-BE49-F238E27FC236}">
-                <a16:creationId xmlns="" xmlns:a16="http://schemas.microsoft.com/office/drawing/2014/main" id="{3BB1710F-7A62-4E14-A523-79DB7AF3578C}"/>
+                <a16:creationId xmlns:a16="http://schemas.microsoft.com/office/drawing/2014/main" xmlns="" id="{3BB1710F-7A62-4E14-A523-79DB7AF3578C}"/>
               </a:ext>
             </a:extLst>
           </p:cNvPr>
@@ -4077,7 +4077,7 @@
           <p:cNvPr id="2" name="Title 1">
             <a:extLst>
               <a:ext uri="{FF2B5EF4-FFF2-40B4-BE49-F238E27FC236}">
-                <a16:creationId xmlns="" xmlns:a16="http://schemas.microsoft.com/office/drawing/2014/main" id="{1B4764F1-FECB-4B75-9A14-126E834E466D}"/>
+                <a16:creationId xmlns:a16="http://schemas.microsoft.com/office/drawing/2014/main" xmlns="" id="{1B4764F1-FECB-4B75-9A14-126E834E466D}"/>
               </a:ext>
             </a:extLst>
           </p:cNvPr>
@@ -4106,7 +4106,7 @@
           <p:cNvPr id="3" name="Content Placeholder 2">
             <a:extLst>
               <a:ext uri="{FF2B5EF4-FFF2-40B4-BE49-F238E27FC236}">
-                <a16:creationId xmlns="" xmlns:a16="http://schemas.microsoft.com/office/drawing/2014/main" id="{928EF53E-3BD0-42CF-8235-385BA7C36220}"/>
+                <a16:creationId xmlns:a16="http://schemas.microsoft.com/office/drawing/2014/main" xmlns="" id="{928EF53E-3BD0-42CF-8235-385BA7C36220}"/>
               </a:ext>
             </a:extLst>
           </p:cNvPr>
@@ -4200,7 +4200,7 @@
           <p:cNvPr id="2" name="Title 1">
             <a:extLst>
               <a:ext uri="{FF2B5EF4-FFF2-40B4-BE49-F238E27FC236}">
-                <a16:creationId xmlns="" xmlns:a16="http://schemas.microsoft.com/office/drawing/2014/main" id="{0458812E-D0EF-4592-8D50-8A836B143E42}"/>
+                <a16:creationId xmlns:a16="http://schemas.microsoft.com/office/drawing/2014/main" xmlns="" id="{0458812E-D0EF-4592-8D50-8A836B143E42}"/>
               </a:ext>
             </a:extLst>
           </p:cNvPr>
@@ -4297,7 +4297,7 @@
           <p:cNvPr id="3" name="Content Placeholder 2">
             <a:extLst>
               <a:ext uri="{FF2B5EF4-FFF2-40B4-BE49-F238E27FC236}">
-                <a16:creationId xmlns="" xmlns:a16="http://schemas.microsoft.com/office/drawing/2014/main" id="{6DC4BE4C-9368-4E1B-AC76-88337059AD3D}"/>
+                <a16:creationId xmlns:a16="http://schemas.microsoft.com/office/drawing/2014/main" xmlns="" id="{6DC4BE4C-9368-4E1B-AC76-88337059AD3D}"/>
               </a:ext>
             </a:extLst>
           </p:cNvPr>
@@ -4358,7 +4358,7 @@
           <p:cNvPr id="2" name="Title 1">
             <a:extLst>
               <a:ext uri="{FF2B5EF4-FFF2-40B4-BE49-F238E27FC236}">
-                <a16:creationId xmlns="" xmlns:a16="http://schemas.microsoft.com/office/drawing/2014/main" id="{B737B787-9675-49F4-BB53-DFA1AB9B71D6}"/>
+                <a16:creationId xmlns:a16="http://schemas.microsoft.com/office/drawing/2014/main" xmlns="" id="{B737B787-9675-49F4-BB53-DFA1AB9B71D6}"/>
               </a:ext>
             </a:extLst>
           </p:cNvPr>
@@ -4387,7 +4387,7 @@
           <p:cNvPr id="3" name="Content Placeholder 2">
             <a:extLst>
               <a:ext uri="{FF2B5EF4-FFF2-40B4-BE49-F238E27FC236}">
-                <a16:creationId xmlns="" xmlns:a16="http://schemas.microsoft.com/office/drawing/2014/main" id="{8FEA94E1-C2DC-488F-A46D-BE2DBBE9C7F6}"/>
+                <a16:creationId xmlns:a16="http://schemas.microsoft.com/office/drawing/2014/main" xmlns="" id="{8FEA94E1-C2DC-488F-A46D-BE2DBBE9C7F6}"/>
               </a:ext>
             </a:extLst>
           </p:cNvPr>
@@ -4451,7 +4451,7 @@
           <p:cNvPr id="2" name="Title 1">
             <a:extLst>
               <a:ext uri="{FF2B5EF4-FFF2-40B4-BE49-F238E27FC236}">
-                <a16:creationId xmlns="" xmlns:a16="http://schemas.microsoft.com/office/drawing/2014/main" id="{7C4EA4F9-2CFF-4842-82DB-21B4127B8D3C}"/>
+                <a16:creationId xmlns:a16="http://schemas.microsoft.com/office/drawing/2014/main" xmlns="" id="{7C4EA4F9-2CFF-4842-82DB-21B4127B8D3C}"/>
               </a:ext>
             </a:extLst>
           </p:cNvPr>
@@ -4487,7 +4487,7 @@
           <p:cNvPr id="5" name="Content Placeholder 4" descr="A screenshot of a computer&#10;&#10;Description automatically generated">
             <a:extLst>
               <a:ext uri="{FF2B5EF4-FFF2-40B4-BE49-F238E27FC236}">
-                <a16:creationId xmlns="" xmlns:a16="http://schemas.microsoft.com/office/drawing/2014/main" id="{1588775F-A18E-4561-9815-8073F4D64F10}"/>
+                <a16:creationId xmlns:a16="http://schemas.microsoft.com/office/drawing/2014/main" xmlns="" id="{1588775F-A18E-4561-9815-8073F4D64F10}"/>
               </a:ext>
             </a:extLst>
           </p:cNvPr>
@@ -4557,7 +4557,7 @@
           <p:cNvPr id="5" name="Content Placeholder 4" descr="A screenshot of a computer&#10;&#10;Description automatically generated">
             <a:extLst>
               <a:ext uri="{FF2B5EF4-FFF2-40B4-BE49-F238E27FC236}">
-                <a16:creationId xmlns="" xmlns:a16="http://schemas.microsoft.com/office/drawing/2014/main" id="{986BB5D6-2EE5-4698-B45F-CD57D94217B5}"/>
+                <a16:creationId xmlns:a16="http://schemas.microsoft.com/office/drawing/2014/main" xmlns="" id="{986BB5D6-2EE5-4698-B45F-CD57D94217B5}"/>
               </a:ext>
             </a:extLst>
           </p:cNvPr>
@@ -4617,56 +4617,6 @@
           <a:chExt cx="0" cy="0"/>
         </a:xfrm>
       </p:grpSpPr>
-      <p:sp>
-        <p:nvSpPr>
-          <p:cNvPr id="2" name="Title 1">
-            <a:extLst>
-              <a:ext uri="{FF2B5EF4-FFF2-40B4-BE49-F238E27FC236}">
-                <a16:creationId xmlns="" xmlns:a16="http://schemas.microsoft.com/office/drawing/2014/main" id="{21B7821F-0927-46A2-AB53-699DE44B1C85}"/>
-              </a:ext>
-            </a:extLst>
-          </p:cNvPr>
-          <p:cNvSpPr>
-            <a:spLocks noGrp="1"/>
-          </p:cNvSpPr>
-          <p:nvPr>
-            <p:ph type="title"/>
-          </p:nvPr>
-        </p:nvSpPr>
-        <p:spPr/>
-        <p:txBody>
-          <a:bodyPr/>
-          <a:lstStyle/>
-          <a:p>
-            <a:endParaRPr lang="en-US"/>
-          </a:p>
-        </p:txBody>
-      </p:sp>
-      <p:sp>
-        <p:nvSpPr>
-          <p:cNvPr id="3" name="Content Placeholder 2">
-            <a:extLst>
-              <a:ext uri="{FF2B5EF4-FFF2-40B4-BE49-F238E27FC236}">
-                <a16:creationId xmlns="" xmlns:a16="http://schemas.microsoft.com/office/drawing/2014/main" id="{08D349F9-9F08-4186-B9E1-38BF346F2D86}"/>
-              </a:ext>
-            </a:extLst>
-          </p:cNvPr>
-          <p:cNvSpPr>
-            <a:spLocks noGrp="1"/>
-          </p:cNvSpPr>
-          <p:nvPr>
-            <p:ph idx="1"/>
-          </p:nvPr>
-        </p:nvSpPr>
-        <p:spPr/>
-        <p:txBody>
-          <a:bodyPr/>
-          <a:lstStyle/>
-          <a:p>
-            <a:endParaRPr lang="en-US"/>
-          </a:p>
-        </p:txBody>
-      </p:sp>
     </p:spTree>
     <p:extLst>
       <p:ext uri="{BB962C8B-B14F-4D97-AF65-F5344CB8AC3E}">
@@ -4702,7 +4652,7 @@
           <p:cNvPr id="2" name="Title 1">
             <a:extLst>
               <a:ext uri="{FF2B5EF4-FFF2-40B4-BE49-F238E27FC236}">
-                <a16:creationId xmlns="" xmlns:a16="http://schemas.microsoft.com/office/drawing/2014/main" id="{4D57E1C5-520E-4FA3-A586-E040AA660E72}"/>
+                <a16:creationId xmlns:a16="http://schemas.microsoft.com/office/drawing/2014/main" xmlns="" id="{4D57E1C5-520E-4FA3-A586-E040AA660E72}"/>
               </a:ext>
             </a:extLst>
           </p:cNvPr>
@@ -4736,7 +4686,7 @@
           <p:cNvPr id="3" name="Content Placeholder 2">
             <a:extLst>
               <a:ext uri="{FF2B5EF4-FFF2-40B4-BE49-F238E27FC236}">
-                <a16:creationId xmlns="" xmlns:a16="http://schemas.microsoft.com/office/drawing/2014/main" id="{7123B0BB-6D89-4802-861E-CA9648FF6379}"/>
+                <a16:creationId xmlns:a16="http://schemas.microsoft.com/office/drawing/2014/main" xmlns="" id="{7123B0BB-6D89-4802-861E-CA9648FF6379}"/>
               </a:ext>
             </a:extLst>
           </p:cNvPr>
@@ -5059,7 +5009,7 @@
           <p:cNvPr id="2" name="Title 1">
             <a:extLst>
               <a:ext uri="{FF2B5EF4-FFF2-40B4-BE49-F238E27FC236}">
-                <a16:creationId xmlns="" xmlns:a16="http://schemas.microsoft.com/office/drawing/2014/main" id="{56DE7892-6AAD-4E4B-B485-21B5ECB7EC8C}"/>
+                <a16:creationId xmlns:a16="http://schemas.microsoft.com/office/drawing/2014/main" xmlns="" id="{56DE7892-6AAD-4E4B-B485-21B5ECB7EC8C}"/>
               </a:ext>
             </a:extLst>
           </p:cNvPr>
@@ -5093,7 +5043,7 @@
           <p:cNvPr id="3" name="Content Placeholder 2">
             <a:extLst>
               <a:ext uri="{FF2B5EF4-FFF2-40B4-BE49-F238E27FC236}">
-                <a16:creationId xmlns="" xmlns:a16="http://schemas.microsoft.com/office/drawing/2014/main" id="{BF115787-C7C5-40FF-9F79-31FD29A6B6B4}"/>
+                <a16:creationId xmlns:a16="http://schemas.microsoft.com/office/drawing/2014/main" xmlns="" id="{BF115787-C7C5-40FF-9F79-31FD29A6B6B4}"/>
               </a:ext>
             </a:extLst>
           </p:cNvPr>
@@ -5282,7 +5232,7 @@
           <p:cNvPr id="2" name="Title 1">
             <a:extLst>
               <a:ext uri="{FF2B5EF4-FFF2-40B4-BE49-F238E27FC236}">
-                <a16:creationId xmlns="" xmlns:a16="http://schemas.microsoft.com/office/drawing/2014/main" id="{B5AA7FA5-7F79-4362-84A7-947BBE478DC1}"/>
+                <a16:creationId xmlns:a16="http://schemas.microsoft.com/office/drawing/2014/main" xmlns="" id="{B5AA7FA5-7F79-4362-84A7-947BBE478DC1}"/>
               </a:ext>
             </a:extLst>
           </p:cNvPr>
@@ -5316,7 +5266,7 @@
           <p:cNvPr id="3" name="Content Placeholder 2">
             <a:extLst>
               <a:ext uri="{FF2B5EF4-FFF2-40B4-BE49-F238E27FC236}">
-                <a16:creationId xmlns="" xmlns:a16="http://schemas.microsoft.com/office/drawing/2014/main" id="{9914B3CA-33C5-47E9-B3FC-EEB1273603F5}"/>
+                <a16:creationId xmlns:a16="http://schemas.microsoft.com/office/drawing/2014/main" xmlns="" id="{9914B3CA-33C5-47E9-B3FC-EEB1273603F5}"/>
               </a:ext>
             </a:extLst>
           </p:cNvPr>
@@ -5428,7 +5378,7 @@
           <p:cNvPr id="2" name="Title 1">
             <a:extLst>
               <a:ext uri="{FF2B5EF4-FFF2-40B4-BE49-F238E27FC236}">
-                <a16:creationId xmlns="" xmlns:a16="http://schemas.microsoft.com/office/drawing/2014/main" id="{DCD523A4-4172-4CF3-87EF-55764807B741}"/>
+                <a16:creationId xmlns:a16="http://schemas.microsoft.com/office/drawing/2014/main" xmlns="" id="{DCD523A4-4172-4CF3-87EF-55764807B741}"/>
               </a:ext>
             </a:extLst>
           </p:cNvPr>
@@ -5464,7 +5414,7 @@
           <p:cNvPr id="4" name="Table 4">
             <a:extLst>
               <a:ext uri="{FF2B5EF4-FFF2-40B4-BE49-F238E27FC236}">
-                <a16:creationId xmlns="" xmlns:a16="http://schemas.microsoft.com/office/drawing/2014/main" id="{251C0C9B-8E40-4667-9FCE-EA58401C9B6D}"/>
+                <a16:creationId xmlns:a16="http://schemas.microsoft.com/office/drawing/2014/main" xmlns="" id="{251C0C9B-8E40-4667-9FCE-EA58401C9B6D}"/>
               </a:ext>
             </a:extLst>
           </p:cNvPr>
@@ -5494,21 +5444,21 @@
                 <a:gridCol w="3505199">
                   <a:extLst>
                     <a:ext uri="{9D8B030D-6E8A-4147-A177-3AD203B41FA5}">
-                      <a16:colId xmlns="" xmlns:a16="http://schemas.microsoft.com/office/drawing/2014/main" val="2498812653"/>
+                      <a16:colId xmlns:a16="http://schemas.microsoft.com/office/drawing/2014/main" xmlns="" val="2498812653"/>
                     </a:ext>
                   </a:extLst>
                 </a:gridCol>
                 <a:gridCol w="3505199">
                   <a:extLst>
                     <a:ext uri="{9D8B030D-6E8A-4147-A177-3AD203B41FA5}">
-                      <a16:colId xmlns="" xmlns:a16="http://schemas.microsoft.com/office/drawing/2014/main" val="1636506021"/>
+                      <a16:colId xmlns:a16="http://schemas.microsoft.com/office/drawing/2014/main" xmlns="" val="1636506021"/>
                     </a:ext>
                   </a:extLst>
                 </a:gridCol>
                 <a:gridCol w="3505199">
                   <a:extLst>
                     <a:ext uri="{9D8B030D-6E8A-4147-A177-3AD203B41FA5}">
-                      <a16:colId xmlns="" xmlns:a16="http://schemas.microsoft.com/office/drawing/2014/main" val="3911463009"/>
+                      <a16:colId xmlns:a16="http://schemas.microsoft.com/office/drawing/2014/main" xmlns="" val="3911463009"/>
                     </a:ext>
                   </a:extLst>
                 </a:gridCol>
@@ -5684,7 +5634,7 @@
                 </a:tc>
                 <a:extLst>
                   <a:ext uri="{0D108BD9-81ED-4DB2-BD59-A6C34878D82A}">
-                    <a16:rowId xmlns="" xmlns:a16="http://schemas.microsoft.com/office/drawing/2014/main" val="3268635304"/>
+                    <a16:rowId xmlns:a16="http://schemas.microsoft.com/office/drawing/2014/main" xmlns="" val="3268635304"/>
                   </a:ext>
                 </a:extLst>
               </a:tr>
@@ -5875,7 +5825,7 @@
                 </a:tc>
                 <a:extLst>
                   <a:ext uri="{0D108BD9-81ED-4DB2-BD59-A6C34878D82A}">
-                    <a16:rowId xmlns="" xmlns:a16="http://schemas.microsoft.com/office/drawing/2014/main" val="2197911722"/>
+                    <a16:rowId xmlns:a16="http://schemas.microsoft.com/office/drawing/2014/main" xmlns="" val="2197911722"/>
                   </a:ext>
                 </a:extLst>
               </a:tr>
@@ -6066,7 +6016,7 @@
                 </a:tc>
                 <a:extLst>
                   <a:ext uri="{0D108BD9-81ED-4DB2-BD59-A6C34878D82A}">
-                    <a16:rowId xmlns="" xmlns:a16="http://schemas.microsoft.com/office/drawing/2014/main" val="2652785360"/>
+                    <a16:rowId xmlns:a16="http://schemas.microsoft.com/office/drawing/2014/main" xmlns="" val="2652785360"/>
                   </a:ext>
                 </a:extLst>
               </a:tr>
@@ -6273,7 +6223,7 @@
                 </a:tc>
                 <a:extLst>
                   <a:ext uri="{0D108BD9-81ED-4DB2-BD59-A6C34878D82A}">
-                    <a16:rowId xmlns="" xmlns:a16="http://schemas.microsoft.com/office/drawing/2014/main" val="534654304"/>
+                    <a16:rowId xmlns:a16="http://schemas.microsoft.com/office/drawing/2014/main" xmlns="" val="534654304"/>
                   </a:ext>
                 </a:extLst>
               </a:tr>
@@ -6464,7 +6414,7 @@
                 </a:tc>
                 <a:extLst>
                   <a:ext uri="{0D108BD9-81ED-4DB2-BD59-A6C34878D82A}">
-                    <a16:rowId xmlns="" xmlns:a16="http://schemas.microsoft.com/office/drawing/2014/main" val="3441806414"/>
+                    <a16:rowId xmlns:a16="http://schemas.microsoft.com/office/drawing/2014/main" xmlns="" val="3441806414"/>
                   </a:ext>
                 </a:extLst>
               </a:tr>
@@ -6655,7 +6605,7 @@
                 </a:tc>
                 <a:extLst>
                   <a:ext uri="{0D108BD9-81ED-4DB2-BD59-A6C34878D82A}">
-                    <a16:rowId xmlns="" xmlns:a16="http://schemas.microsoft.com/office/drawing/2014/main" val="492611576"/>
+                    <a16:rowId xmlns:a16="http://schemas.microsoft.com/office/drawing/2014/main" xmlns="" val="492611576"/>
                   </a:ext>
                 </a:extLst>
               </a:tr>
@@ -6843,7 +6793,7 @@
                 </a:tc>
                 <a:extLst>
                   <a:ext uri="{0D108BD9-81ED-4DB2-BD59-A6C34878D82A}">
-                    <a16:rowId xmlns="" xmlns:a16="http://schemas.microsoft.com/office/drawing/2014/main" val="3415118378"/>
+                    <a16:rowId xmlns:a16="http://schemas.microsoft.com/office/drawing/2014/main" xmlns="" val="3415118378"/>
                   </a:ext>
                 </a:extLst>
               </a:tr>
@@ -7009,7 +6959,7 @@
                 </a:tc>
                 <a:extLst>
                   <a:ext uri="{0D108BD9-81ED-4DB2-BD59-A6C34878D82A}">
-                    <a16:rowId xmlns="" xmlns:a16="http://schemas.microsoft.com/office/drawing/2014/main" val="583496555"/>
+                    <a16:rowId xmlns:a16="http://schemas.microsoft.com/office/drawing/2014/main" xmlns="" val="583496555"/>
                   </a:ext>
                 </a:extLst>
               </a:tr>
@@ -7052,7 +7002,7 @@
           <p:cNvPr id="2" name="Title 1">
             <a:extLst>
               <a:ext uri="{FF2B5EF4-FFF2-40B4-BE49-F238E27FC236}">
-                <a16:creationId xmlns="" xmlns:a16="http://schemas.microsoft.com/office/drawing/2014/main" id="{2FAB9958-B62B-4060-8224-1BF9A2F435ED}"/>
+                <a16:creationId xmlns:a16="http://schemas.microsoft.com/office/drawing/2014/main" xmlns="" id="{2FAB9958-B62B-4060-8224-1BF9A2F435ED}"/>
               </a:ext>
             </a:extLst>
           </p:cNvPr>
@@ -7099,7 +7049,7 @@
           <p:cNvPr id="3" name="Content Placeholder 2">
             <a:extLst>
               <a:ext uri="{FF2B5EF4-FFF2-40B4-BE49-F238E27FC236}">
-                <a16:creationId xmlns="" xmlns:a16="http://schemas.microsoft.com/office/drawing/2014/main" id="{AAB8FE39-70FE-4FFF-940E-80858FD6080A}"/>
+                <a16:creationId xmlns:a16="http://schemas.microsoft.com/office/drawing/2014/main" xmlns="" id="{AAB8FE39-70FE-4FFF-940E-80858FD6080A}"/>
               </a:ext>
             </a:extLst>
           </p:cNvPr>
@@ -7220,7 +7170,7 @@
           <p:cNvPr id="2" name="Title 1">
             <a:extLst>
               <a:ext uri="{FF2B5EF4-FFF2-40B4-BE49-F238E27FC236}">
-                <a16:creationId xmlns="" xmlns:a16="http://schemas.microsoft.com/office/drawing/2014/main" id="{1D9E7589-2ABE-45D5-A06C-3B2BD54A6CD6}"/>
+                <a16:creationId xmlns:a16="http://schemas.microsoft.com/office/drawing/2014/main" xmlns="" id="{1D9E7589-2ABE-45D5-A06C-3B2BD54A6CD6}"/>
               </a:ext>
             </a:extLst>
           </p:cNvPr>
@@ -7256,7 +7206,7 @@
           <p:cNvPr id="3" name="Content Placeholder 2">
             <a:extLst>
               <a:ext uri="{FF2B5EF4-FFF2-40B4-BE49-F238E27FC236}">
-                <a16:creationId xmlns="" xmlns:a16="http://schemas.microsoft.com/office/drawing/2014/main" id="{D079487C-CE65-412E-BBCE-401247007AD1}"/>
+                <a16:creationId xmlns:a16="http://schemas.microsoft.com/office/drawing/2014/main" xmlns="" id="{D079487C-CE65-412E-BBCE-401247007AD1}"/>
               </a:ext>
             </a:extLst>
           </p:cNvPr>
@@ -7362,7 +7312,7 @@
           <p:cNvPr id="2" name="Title 1">
             <a:extLst>
               <a:ext uri="{FF2B5EF4-FFF2-40B4-BE49-F238E27FC236}">
-                <a16:creationId xmlns="" xmlns:a16="http://schemas.microsoft.com/office/drawing/2014/main" id="{F5FCAC37-FCD7-4874-A923-C3B1707012B5}"/>
+                <a16:creationId xmlns:a16="http://schemas.microsoft.com/office/drawing/2014/main" xmlns="" id="{F5FCAC37-FCD7-4874-A923-C3B1707012B5}"/>
               </a:ext>
             </a:extLst>
           </p:cNvPr>
@@ -7396,7 +7346,7 @@
           <p:cNvPr id="3" name="Content Placeholder 2">
             <a:extLst>
               <a:ext uri="{FF2B5EF4-FFF2-40B4-BE49-F238E27FC236}">
-                <a16:creationId xmlns="" xmlns:a16="http://schemas.microsoft.com/office/drawing/2014/main" id="{C3959E85-874E-43C0-A2D3-4318AE81EB91}"/>
+                <a16:creationId xmlns:a16="http://schemas.microsoft.com/office/drawing/2014/main" xmlns="" id="{C3959E85-874E-43C0-A2D3-4318AE81EB91}"/>
               </a:ext>
             </a:extLst>
           </p:cNvPr>
@@ -7487,7 +7437,7 @@
           <p:cNvPr id="2" name="Title 1">
             <a:extLst>
               <a:ext uri="{FF2B5EF4-FFF2-40B4-BE49-F238E27FC236}">
-                <a16:creationId xmlns="" xmlns:a16="http://schemas.microsoft.com/office/drawing/2014/main" id="{79E876EA-47CE-4846-8748-666D13086F4E}"/>
+                <a16:creationId xmlns:a16="http://schemas.microsoft.com/office/drawing/2014/main" xmlns="" id="{79E876EA-47CE-4846-8748-666D13086F4E}"/>
               </a:ext>
             </a:extLst>
           </p:cNvPr>

</xml_diff>